<commit_message>
add content to chapter 9
</commit_message>
<xml_diff>
--- a/course/compiler/lecture/(Spring2020)Lecture9.pptx
+++ b/course/compiler/lecture/(Spring2020)Lecture9.pptx
@@ -5,10 +5,10 @@
     <p:sldMasterId id="2147483648" r:id="rId4"/>
   </p:sldMasterIdLst>
   <p:notesMasterIdLst>
-    <p:notesMasterId r:id="rId12"/>
+    <p:notesMasterId r:id="rId20"/>
   </p:notesMasterIdLst>
   <p:handoutMasterIdLst>
-    <p:handoutMasterId r:id="rId13"/>
+    <p:handoutMasterId r:id="rId21"/>
   </p:handoutMasterIdLst>
   <p:sldIdLst>
     <p:sldId id="256" r:id="rId5"/>
@@ -18,6 +18,14 @@
     <p:sldId id="280" r:id="rId9"/>
     <p:sldId id="281" r:id="rId10"/>
     <p:sldId id="282" r:id="rId11"/>
+    <p:sldId id="283" r:id="rId12"/>
+    <p:sldId id="284" r:id="rId13"/>
+    <p:sldId id="285" r:id="rId14"/>
+    <p:sldId id="286" r:id="rId15"/>
+    <p:sldId id="288" r:id="rId16"/>
+    <p:sldId id="289" r:id="rId17"/>
+    <p:sldId id="290" r:id="rId18"/>
+    <p:sldId id="291" r:id="rId19"/>
   </p:sldIdLst>
   <p:sldSz cx="9144000" cy="6858000" type="screen4x3"/>
   <p:notesSz cx="6858000" cy="9144000"/>
@@ -229,7 +237,7 @@
                 <a:ea typeface="微软雅黑" panose="020B0503020204020204" pitchFamily="34" charset="-122"/>
               </a:rPr>
               <a:pPr algn="r" rtl="0"/>
-              <a:t>2020/5/26</a:t>
+              <a:t>2020/5/27</a:t>
             </a:fld>
             <a:endParaRPr lang="zh-CN" altLang="en-US" dirty="0">
               <a:latin typeface="微软雅黑" panose="020B0503020204020204" pitchFamily="34" charset="-122"/>
@@ -416,7 +424,7 @@
             <a:fld id="{229B22C3-6CB1-491B-AD00-E0837F23A3F3}" type="datetime1">
               <a:rPr lang="zh-CN" altLang="en-US" smtClean="0"/>
               <a:pPr/>
-              <a:t>2020/5/26</a:t>
+              <a:t>2020/5/27</a:t>
             </a:fld>
             <a:endParaRPr lang="zh-CN" altLang="en-US" dirty="0"/>
           </a:p>
@@ -1012,7 +1020,7 @@
             <a:fld id="{A7392AAC-879E-4B39-8824-AF6B730A809E}" type="datetime1">
               <a:rPr lang="zh-CN" altLang="en-US" smtClean="0"/>
               <a:pPr/>
-              <a:t>2020/5/26</a:t>
+              <a:t>2020/5/27</a:t>
             </a:fld>
             <a:endParaRPr lang="zh-CN" altLang="en-US" dirty="0"/>
           </a:p>
@@ -1353,7 +1361,7 @@
             <a:fld id="{7118C275-B304-48F5-8C4F-015CBCF4E7C1}" type="datetime1">
               <a:rPr lang="zh-CN" altLang="en-US" smtClean="0"/>
               <a:pPr/>
-              <a:t>2020/5/26</a:t>
+              <a:t>2020/5/27</a:t>
             </a:fld>
             <a:r>
               <a:rPr lang="zh-CN" altLang="en-US" dirty="0"/>
@@ -1559,7 +1567,7 @@
             <a:fld id="{98791AA9-DDCB-4BA8-AD1D-963A3AA00622}" type="datetime1">
               <a:rPr lang="zh-CN" altLang="en-US" smtClean="0"/>
               <a:pPr/>
-              <a:t>2020/5/26</a:t>
+              <a:t>2020/5/27</a:t>
             </a:fld>
             <a:endParaRPr lang="zh-CN" altLang="en-US" dirty="0"/>
           </a:p>
@@ -1763,7 +1771,7 @@
             <a:fld id="{9170426F-E661-472B-BE42-25E072CD46D9}" type="datetime1">
               <a:rPr lang="zh-CN" altLang="en-US" smtClean="0"/>
               <a:pPr/>
-              <a:t>2020/5/26</a:t>
+              <a:t>2020/5/27</a:t>
             </a:fld>
             <a:endParaRPr lang="zh-CN" altLang="en-US" dirty="0"/>
           </a:p>
@@ -2085,7 +2093,7 @@
             <a:fld id="{9BA78444-6099-4C0A-A3A9-C6F3C5D7F289}" type="datetime1">
               <a:rPr lang="zh-CN" altLang="en-US" smtClean="0"/>
               <a:pPr/>
-              <a:t>2020/5/26</a:t>
+              <a:t>2020/5/27</a:t>
             </a:fld>
             <a:endParaRPr lang="zh-CN" altLang="en-US" dirty="0"/>
           </a:p>
@@ -3197,7 +3205,7 @@
             <a:fld id="{AF5F6A19-70BF-4380-9A40-68C9536408C6}" type="datetime1">
               <a:rPr lang="zh-CN" altLang="en-US" smtClean="0"/>
               <a:pPr/>
-              <a:t>2020/5/26</a:t>
+              <a:t>2020/5/27</a:t>
             </a:fld>
             <a:endParaRPr lang="zh-CN" altLang="en-US" dirty="0"/>
           </a:p>
@@ -3596,7 +3604,7 @@
             <a:fld id="{6017EB90-196C-4C15-BD31-13E0E0436C73}" type="datetime1">
               <a:rPr lang="zh-CN" altLang="en-US" smtClean="0"/>
               <a:pPr/>
-              <a:t>2020/5/26</a:t>
+              <a:t>2020/5/27</a:t>
             </a:fld>
             <a:r>
               <a:rPr lang="zh-CN" altLang="en-US" dirty="0"/>
@@ -4078,7 +4086,7 @@
             <a:fld id="{C2EC0F41-B48F-4298-A7F6-618EB9D22195}" type="datetime1">
               <a:rPr lang="zh-CN" altLang="en-US" smtClean="0"/>
               <a:pPr/>
-              <a:t>2020/5/26</a:t>
+              <a:t>2020/5/27</a:t>
             </a:fld>
             <a:endParaRPr lang="zh-CN" altLang="en-US" dirty="0"/>
           </a:p>
@@ -4229,7 +4237,7 @@
             <a:fld id="{7DB2D836-56E8-4B15-857C-14B1A5B3B67B}" type="datetime1">
               <a:rPr lang="zh-CN" altLang="en-US" smtClean="0"/>
               <a:pPr/>
-              <a:t>2020/5/26</a:t>
+              <a:t>2020/5/27</a:t>
             </a:fld>
             <a:endParaRPr lang="zh-CN" altLang="en-US" dirty="0"/>
           </a:p>
@@ -4347,7 +4355,7 @@
             <a:fld id="{038D929F-7D8C-4CC3-8AC7-BB9B8FE2DEBF}" type="datetime1">
               <a:rPr lang="zh-CN" altLang="en-US" smtClean="0"/>
               <a:pPr/>
-              <a:t>2020/5/26</a:t>
+              <a:t>2020/5/27</a:t>
             </a:fld>
             <a:endParaRPr lang="zh-CN" altLang="en-US" dirty="0"/>
           </a:p>
@@ -4650,7 +4658,7 @@
             <a:fld id="{F7892ACC-8BC8-4C9E-9D2B-0669DA5038B6}" type="datetime1">
               <a:rPr lang="zh-CN" altLang="en-US" smtClean="0"/>
               <a:pPr/>
-              <a:t>2020/5/26</a:t>
+              <a:t>2020/5/27</a:t>
             </a:fld>
             <a:endParaRPr lang="zh-CN" altLang="en-US" dirty="0"/>
           </a:p>
@@ -4916,7 +4924,7 @@
             <a:fld id="{660B6A15-7713-4A08-BBFD-F297CCC2B976}" type="datetime1">
               <a:rPr lang="zh-CN" altLang="en-US" smtClean="0"/>
               <a:pPr/>
-              <a:t>2020/5/26</a:t>
+              <a:t>2020/5/27</a:t>
             </a:fld>
             <a:r>
               <a:rPr lang="zh-CN" altLang="en-US" dirty="0"/>
@@ -5604,6 +5612,1050 @@
 </p:sld>
 </file>
 
+<file path=ppt/slides/slide10.xml><?xml version="1.0" encoding="utf-8"?>
+<p:sld xmlns:a="http://schemas.openxmlformats.org/drawingml/2006/main" xmlns:r="http://schemas.openxmlformats.org/officeDocument/2006/relationships" xmlns:p="http://schemas.openxmlformats.org/presentationml/2006/main">
+  <p:cSld>
+    <p:spTree>
+      <p:nvGrpSpPr>
+        <p:cNvPr id="1" name=""/>
+        <p:cNvGrpSpPr/>
+        <p:nvPr/>
+      </p:nvGrpSpPr>
+      <p:grpSpPr>
+        <a:xfrm>
+          <a:off x="0" y="0"/>
+          <a:ext cx="0" cy="0"/>
+          <a:chOff x="0" y="0"/>
+          <a:chExt cx="0" cy="0"/>
+        </a:xfrm>
+      </p:grpSpPr>
+      <p:sp>
+        <p:nvSpPr>
+          <p:cNvPr id="2" name="标题 1"/>
+          <p:cNvSpPr>
+            <a:spLocks noGrp="1"/>
+          </p:cNvSpPr>
+          <p:nvPr>
+            <p:ph type="title"/>
+          </p:nvPr>
+        </p:nvSpPr>
+        <p:spPr/>
+        <p:txBody>
+          <a:bodyPr/>
+          <a:lstStyle/>
+          <a:p>
+            <a:r>
+              <a:rPr lang="en-US" altLang="zh-CN" dirty="0" smtClean="0"/>
+              <a:t>8.2 The </a:t>
+            </a:r>
+            <a:r>
+              <a:rPr lang="en-US" altLang="zh-CN" dirty="0"/>
+              <a:t>Target </a:t>
+            </a:r>
+            <a:r>
+              <a:rPr lang="en-US" altLang="zh-CN" dirty="0" smtClean="0"/>
+              <a:t>Language – Examples</a:t>
+            </a:r>
+            <a:endParaRPr lang="zh-CN" altLang="en-US" dirty="0"/>
+          </a:p>
+        </p:txBody>
+      </p:sp>
+      <p:pic>
+        <p:nvPicPr>
+          <p:cNvPr id="5" name="图片 4"/>
+          <p:cNvPicPr>
+            <a:picLocks noChangeAspect="1"/>
+          </p:cNvPicPr>
+          <p:nvPr/>
+        </p:nvPicPr>
+        <p:blipFill>
+          <a:blip r:embed="rId2"/>
+          <a:stretch>
+            <a:fillRect/>
+          </a:stretch>
+        </p:blipFill>
+        <p:spPr>
+          <a:xfrm>
+            <a:off x="768345" y="1538813"/>
+            <a:ext cx="7504762" cy="4857143"/>
+          </a:xfrm>
+          <a:prstGeom prst="rect">
+            <a:avLst/>
+          </a:prstGeom>
+        </p:spPr>
+      </p:pic>
+    </p:spTree>
+    <p:extLst>
+      <p:ext uri="{BB962C8B-B14F-4D97-AF65-F5344CB8AC3E}">
+        <p14:creationId xmlns:p14="http://schemas.microsoft.com/office/powerpoint/2010/main" val="2707928671"/>
+      </p:ext>
+    </p:extLst>
+  </p:cSld>
+  <p:clrMapOvr>
+    <a:masterClrMapping/>
+  </p:clrMapOvr>
+  <mc:AlternateContent xmlns:mc="http://schemas.openxmlformats.org/markup-compatibility/2006" xmlns:p14="http://schemas.microsoft.com/office/powerpoint/2010/main">
+    <mc:Choice Requires="p14">
+      <p:transition spd="med" p14:dur="700">
+        <p:fade/>
+      </p:transition>
+    </mc:Choice>
+    <mc:Fallback xmlns="">
+      <p:transition spd="med">
+        <p:fade/>
+      </p:transition>
+    </mc:Fallback>
+  </mc:AlternateContent>
+</p:sld>
+</file>
+
+<file path=ppt/slides/slide11.xml><?xml version="1.0" encoding="utf-8"?>
+<p:sld xmlns:a="http://schemas.openxmlformats.org/drawingml/2006/main" xmlns:r="http://schemas.openxmlformats.org/officeDocument/2006/relationships" xmlns:p="http://schemas.openxmlformats.org/presentationml/2006/main">
+  <p:cSld>
+    <p:spTree>
+      <p:nvGrpSpPr>
+        <p:cNvPr id="1" name=""/>
+        <p:cNvGrpSpPr/>
+        <p:nvPr/>
+      </p:nvGrpSpPr>
+      <p:grpSpPr>
+        <a:xfrm>
+          <a:off x="0" y="0"/>
+          <a:ext cx="0" cy="0"/>
+          <a:chOff x="0" y="0"/>
+          <a:chExt cx="0" cy="0"/>
+        </a:xfrm>
+      </p:grpSpPr>
+      <p:sp>
+        <p:nvSpPr>
+          <p:cNvPr id="2" name="标题 1"/>
+          <p:cNvSpPr>
+            <a:spLocks noGrp="1"/>
+          </p:cNvSpPr>
+          <p:nvPr>
+            <p:ph type="title"/>
+          </p:nvPr>
+        </p:nvSpPr>
+        <p:spPr/>
+        <p:txBody>
+          <a:bodyPr/>
+          <a:lstStyle/>
+          <a:p>
+            <a:r>
+              <a:rPr lang="en-US" altLang="zh-CN" dirty="0" smtClean="0"/>
+              <a:t>8.2 The </a:t>
+            </a:r>
+            <a:r>
+              <a:rPr lang="en-US" altLang="zh-CN" dirty="0"/>
+              <a:t>Target </a:t>
+            </a:r>
+            <a:r>
+              <a:rPr lang="en-US" altLang="zh-CN" dirty="0" smtClean="0"/>
+              <a:t>Language – Examples</a:t>
+            </a:r>
+            <a:endParaRPr lang="zh-CN" altLang="en-US" dirty="0"/>
+          </a:p>
+        </p:txBody>
+      </p:sp>
+      <p:pic>
+        <p:nvPicPr>
+          <p:cNvPr id="3" name="图片 2"/>
+          <p:cNvPicPr>
+            <a:picLocks noChangeAspect="1"/>
+          </p:cNvPicPr>
+          <p:nvPr/>
+        </p:nvPicPr>
+        <p:blipFill>
+          <a:blip r:embed="rId2"/>
+          <a:stretch>
+            <a:fillRect/>
+          </a:stretch>
+        </p:blipFill>
+        <p:spPr>
+          <a:xfrm>
+            <a:off x="739772" y="1342739"/>
+            <a:ext cx="7561905" cy="3266667"/>
+          </a:xfrm>
+          <a:prstGeom prst="rect">
+            <a:avLst/>
+          </a:prstGeom>
+        </p:spPr>
+      </p:pic>
+      <p:pic>
+        <p:nvPicPr>
+          <p:cNvPr id="4" name="图片 3"/>
+          <p:cNvPicPr>
+            <a:picLocks noChangeAspect="1"/>
+          </p:cNvPicPr>
+          <p:nvPr/>
+        </p:nvPicPr>
+        <p:blipFill>
+          <a:blip r:embed="rId3"/>
+          <a:stretch>
+            <a:fillRect/>
+          </a:stretch>
+        </p:blipFill>
+        <p:spPr>
+          <a:xfrm>
+            <a:off x="839483" y="4562481"/>
+            <a:ext cx="6285714" cy="809524"/>
+          </a:xfrm>
+          <a:prstGeom prst="rect">
+            <a:avLst/>
+          </a:prstGeom>
+        </p:spPr>
+      </p:pic>
+      <p:pic>
+        <p:nvPicPr>
+          <p:cNvPr id="6" name="图片 5"/>
+          <p:cNvPicPr>
+            <a:picLocks noChangeAspect="1"/>
+          </p:cNvPicPr>
+          <p:nvPr/>
+        </p:nvPicPr>
+        <p:blipFill>
+          <a:blip r:embed="rId4"/>
+          <a:stretch>
+            <a:fillRect/>
+          </a:stretch>
+        </p:blipFill>
+        <p:spPr>
+          <a:xfrm>
+            <a:off x="883749" y="5315143"/>
+            <a:ext cx="5257143" cy="1542857"/>
+          </a:xfrm>
+          <a:prstGeom prst="rect">
+            <a:avLst/>
+          </a:prstGeom>
+        </p:spPr>
+      </p:pic>
+    </p:spTree>
+    <p:extLst>
+      <p:ext uri="{BB962C8B-B14F-4D97-AF65-F5344CB8AC3E}">
+        <p14:creationId xmlns:p14="http://schemas.microsoft.com/office/powerpoint/2010/main" val="649376807"/>
+      </p:ext>
+    </p:extLst>
+  </p:cSld>
+  <p:clrMapOvr>
+    <a:masterClrMapping/>
+  </p:clrMapOvr>
+  <mc:AlternateContent xmlns:mc="http://schemas.openxmlformats.org/markup-compatibility/2006" xmlns:p14="http://schemas.microsoft.com/office/powerpoint/2010/main">
+    <mc:Choice Requires="p14">
+      <p:transition spd="med" p14:dur="700">
+        <p:fade/>
+      </p:transition>
+    </mc:Choice>
+    <mc:Fallback xmlns="">
+      <p:transition spd="med">
+        <p:fade/>
+      </p:transition>
+    </mc:Fallback>
+  </mc:AlternateContent>
+</p:sld>
+</file>
+
+<file path=ppt/slides/slide12.xml><?xml version="1.0" encoding="utf-8"?>
+<p:sld xmlns:a="http://schemas.openxmlformats.org/drawingml/2006/main" xmlns:r="http://schemas.openxmlformats.org/officeDocument/2006/relationships" xmlns:p="http://schemas.openxmlformats.org/presentationml/2006/main">
+  <p:cSld>
+    <p:spTree>
+      <p:nvGrpSpPr>
+        <p:cNvPr id="1" name=""/>
+        <p:cNvGrpSpPr/>
+        <p:nvPr/>
+      </p:nvGrpSpPr>
+      <p:grpSpPr>
+        <a:xfrm>
+          <a:off x="0" y="0"/>
+          <a:ext cx="0" cy="0"/>
+          <a:chOff x="0" y="0"/>
+          <a:chExt cx="0" cy="0"/>
+        </a:xfrm>
+      </p:grpSpPr>
+      <p:sp>
+        <p:nvSpPr>
+          <p:cNvPr id="2" name="标题 1"/>
+          <p:cNvSpPr>
+            <a:spLocks noGrp="1"/>
+          </p:cNvSpPr>
+          <p:nvPr>
+            <p:ph type="title"/>
+          </p:nvPr>
+        </p:nvSpPr>
+        <p:spPr/>
+        <p:txBody>
+          <a:bodyPr/>
+          <a:lstStyle/>
+          <a:p>
+            <a:r>
+              <a:rPr lang="en-US" altLang="zh-CN" dirty="0"/>
+              <a:t>8.2 The Target Language – Instruction Cost</a:t>
+            </a:r>
+            <a:endParaRPr lang="zh-CN" altLang="en-US" dirty="0"/>
+          </a:p>
+        </p:txBody>
+      </p:sp>
+      <p:sp>
+        <p:nvSpPr>
+          <p:cNvPr id="3" name="内容占位符 2"/>
+          <p:cNvSpPr>
+            <a:spLocks noGrp="1"/>
+          </p:cNvSpPr>
+          <p:nvPr>
+            <p:ph idx="1"/>
+          </p:nvPr>
+        </p:nvSpPr>
+        <p:spPr/>
+        <p:txBody>
+          <a:bodyPr/>
+          <a:lstStyle/>
+          <a:p>
+            <a:r>
+              <a:rPr lang="en-US" altLang="zh-CN" dirty="0" smtClean="0"/>
+              <a:t>We assume </a:t>
+            </a:r>
+            <a:r>
+              <a:rPr lang="en-US" altLang="zh-CN" dirty="0"/>
+              <a:t>each </a:t>
+            </a:r>
+            <a:r>
+              <a:rPr lang="en-US" altLang="zh-CN" dirty="0" smtClean="0"/>
+              <a:t>target-language instruction </a:t>
+            </a:r>
+            <a:r>
+              <a:rPr lang="en-US" altLang="zh-CN" dirty="0"/>
+              <a:t>has an associated cost. For simplicity, we take the cost of an </a:t>
+            </a:r>
+            <a:r>
+              <a:rPr lang="en-US" altLang="zh-CN" dirty="0" smtClean="0"/>
+              <a:t>instruction to </a:t>
+            </a:r>
+            <a:r>
+              <a:rPr lang="en-US" altLang="zh-CN" dirty="0"/>
+              <a:t>be one plus the costs associated with the addressing modes of </a:t>
+            </a:r>
+            <a:r>
+              <a:rPr lang="en-US" altLang="zh-CN" dirty="0" smtClean="0"/>
+              <a:t>the operands</a:t>
+            </a:r>
+            <a:r>
+              <a:rPr lang="en-US" altLang="zh-CN" dirty="0"/>
+              <a:t>.</a:t>
+            </a:r>
+            <a:endParaRPr lang="zh-CN" altLang="en-US" dirty="0"/>
+          </a:p>
+        </p:txBody>
+      </p:sp>
+      <p:pic>
+        <p:nvPicPr>
+          <p:cNvPr id="4" name="图片 3"/>
+          <p:cNvPicPr>
+            <a:picLocks noChangeAspect="1"/>
+          </p:cNvPicPr>
+          <p:nvPr/>
+        </p:nvPicPr>
+        <p:blipFill>
+          <a:blip r:embed="rId2"/>
+          <a:stretch>
+            <a:fillRect/>
+          </a:stretch>
+        </p:blipFill>
+        <p:spPr>
+          <a:xfrm>
+            <a:off x="934033" y="2465556"/>
+            <a:ext cx="7190476" cy="2952381"/>
+          </a:xfrm>
+          <a:prstGeom prst="rect">
+            <a:avLst/>
+          </a:prstGeom>
+        </p:spPr>
+      </p:pic>
+    </p:spTree>
+    <p:extLst>
+      <p:ext uri="{BB962C8B-B14F-4D97-AF65-F5344CB8AC3E}">
+        <p14:creationId xmlns:p14="http://schemas.microsoft.com/office/powerpoint/2010/main" val="1721618236"/>
+      </p:ext>
+    </p:extLst>
+  </p:cSld>
+  <p:clrMapOvr>
+    <a:masterClrMapping/>
+  </p:clrMapOvr>
+  <mc:AlternateContent xmlns:mc="http://schemas.openxmlformats.org/markup-compatibility/2006" xmlns:p14="http://schemas.microsoft.com/office/powerpoint/2010/main">
+    <mc:Choice Requires="p14">
+      <p:transition spd="med" p14:dur="700">
+        <p:fade/>
+      </p:transition>
+    </mc:Choice>
+    <mc:Fallback xmlns="">
+      <p:transition spd="med">
+        <p:fade/>
+      </p:transition>
+    </mc:Fallback>
+  </mc:AlternateContent>
+</p:sld>
+</file>
+
+<file path=ppt/slides/slide13.xml><?xml version="1.0" encoding="utf-8"?>
+<p:sld xmlns:a="http://schemas.openxmlformats.org/drawingml/2006/main" xmlns:r="http://schemas.openxmlformats.org/officeDocument/2006/relationships" xmlns:p="http://schemas.openxmlformats.org/presentationml/2006/main">
+  <p:cSld>
+    <p:spTree>
+      <p:nvGrpSpPr>
+        <p:cNvPr id="1" name=""/>
+        <p:cNvGrpSpPr/>
+        <p:nvPr/>
+      </p:nvGrpSpPr>
+      <p:grpSpPr>
+        <a:xfrm>
+          <a:off x="0" y="0"/>
+          <a:ext cx="0" cy="0"/>
+          <a:chOff x="0" y="0"/>
+          <a:chExt cx="0" cy="0"/>
+        </a:xfrm>
+      </p:grpSpPr>
+      <p:sp>
+        <p:nvSpPr>
+          <p:cNvPr id="2" name="标题 1"/>
+          <p:cNvSpPr>
+            <a:spLocks noGrp="1"/>
+          </p:cNvSpPr>
+          <p:nvPr>
+            <p:ph type="title"/>
+          </p:nvPr>
+        </p:nvSpPr>
+        <p:spPr/>
+        <p:txBody>
+          <a:bodyPr/>
+          <a:lstStyle/>
+          <a:p>
+            <a:r>
+              <a:rPr lang="en-US" altLang="zh-CN" dirty="0"/>
+              <a:t>8.3 Addresses in the Target Code</a:t>
+            </a:r>
+            <a:endParaRPr lang="zh-CN" altLang="en-US" dirty="0"/>
+          </a:p>
+        </p:txBody>
+      </p:sp>
+      <p:sp>
+        <p:nvSpPr>
+          <p:cNvPr id="5" name="内容占位符 4"/>
+          <p:cNvSpPr>
+            <a:spLocks noGrp="1"/>
+          </p:cNvSpPr>
+          <p:nvPr>
+            <p:ph idx="1"/>
+          </p:nvPr>
+        </p:nvSpPr>
+        <p:spPr>
+          <a:xfrm>
+            <a:off x="828675" y="1600200"/>
+            <a:ext cx="7486650" cy="989176"/>
+          </a:xfrm>
+        </p:spPr>
+        <p:txBody>
+          <a:bodyPr/>
+          <a:lstStyle/>
+          <a:p>
+            <a:r>
+              <a:rPr lang="en-US" altLang="zh-CN" dirty="0" smtClean="0"/>
+              <a:t>In the last chapter, we </a:t>
+            </a:r>
+            <a:r>
+              <a:rPr lang="en-US" altLang="zh-CN" dirty="0"/>
+              <a:t>described how </a:t>
+            </a:r>
+            <a:r>
+              <a:rPr lang="en-US" altLang="zh-CN" dirty="0" smtClean="0"/>
+              <a:t>each executing </a:t>
+            </a:r>
+            <a:r>
+              <a:rPr lang="en-US" altLang="zh-CN" dirty="0"/>
+              <a:t>program runs in its own logical address space that was </a:t>
+            </a:r>
+            <a:r>
+              <a:rPr lang="en-US" altLang="zh-CN" dirty="0" smtClean="0"/>
+              <a:t>partitioned into </a:t>
+            </a:r>
+            <a:r>
+              <a:rPr lang="en-US" altLang="zh-CN" dirty="0"/>
+              <a:t>four code and data areas:</a:t>
+            </a:r>
+            <a:endParaRPr lang="zh-CN" altLang="en-US" dirty="0"/>
+          </a:p>
+        </p:txBody>
+      </p:sp>
+      <p:pic>
+        <p:nvPicPr>
+          <p:cNvPr id="6" name="图片 5"/>
+          <p:cNvPicPr>
+            <a:picLocks noChangeAspect="1"/>
+          </p:cNvPicPr>
+          <p:nvPr/>
+        </p:nvPicPr>
+        <p:blipFill>
+          <a:blip r:embed="rId2"/>
+          <a:stretch>
+            <a:fillRect/>
+          </a:stretch>
+        </p:blipFill>
+        <p:spPr>
+          <a:xfrm>
+            <a:off x="972849" y="2432561"/>
+            <a:ext cx="7266667" cy="3428571"/>
+          </a:xfrm>
+          <a:prstGeom prst="rect">
+            <a:avLst/>
+          </a:prstGeom>
+        </p:spPr>
+      </p:pic>
+    </p:spTree>
+    <p:extLst>
+      <p:ext uri="{BB962C8B-B14F-4D97-AF65-F5344CB8AC3E}">
+        <p14:creationId xmlns:p14="http://schemas.microsoft.com/office/powerpoint/2010/main" val="244648622"/>
+      </p:ext>
+    </p:extLst>
+  </p:cSld>
+  <p:clrMapOvr>
+    <a:masterClrMapping/>
+  </p:clrMapOvr>
+  <mc:AlternateContent xmlns:mc="http://schemas.openxmlformats.org/markup-compatibility/2006" xmlns:p14="http://schemas.microsoft.com/office/powerpoint/2010/main">
+    <mc:Choice Requires="p14">
+      <p:transition spd="med" p14:dur="700">
+        <p:fade/>
+      </p:transition>
+    </mc:Choice>
+    <mc:Fallback xmlns="">
+      <p:transition spd="med">
+        <p:fade/>
+      </p:transition>
+    </mc:Fallback>
+  </mc:AlternateContent>
+</p:sld>
+</file>
+
+<file path=ppt/slides/slide14.xml><?xml version="1.0" encoding="utf-8"?>
+<p:sld xmlns:a="http://schemas.openxmlformats.org/drawingml/2006/main" xmlns:r="http://schemas.openxmlformats.org/officeDocument/2006/relationships" xmlns:p="http://schemas.openxmlformats.org/presentationml/2006/main">
+  <p:cSld>
+    <p:spTree>
+      <p:nvGrpSpPr>
+        <p:cNvPr id="1" name=""/>
+        <p:cNvGrpSpPr/>
+        <p:nvPr/>
+      </p:nvGrpSpPr>
+      <p:grpSpPr>
+        <a:xfrm>
+          <a:off x="0" y="0"/>
+          <a:ext cx="0" cy="0"/>
+          <a:chOff x="0" y="0"/>
+          <a:chExt cx="0" cy="0"/>
+        </a:xfrm>
+      </p:grpSpPr>
+      <p:sp>
+        <p:nvSpPr>
+          <p:cNvPr id="2" name="标题 1"/>
+          <p:cNvSpPr>
+            <a:spLocks noGrp="1"/>
+          </p:cNvSpPr>
+          <p:nvPr>
+            <p:ph type="title"/>
+          </p:nvPr>
+        </p:nvSpPr>
+        <p:spPr/>
+        <p:txBody>
+          <a:bodyPr/>
+          <a:lstStyle/>
+          <a:p>
+            <a:r>
+              <a:rPr lang="en-US" altLang="zh-CN" dirty="0"/>
+              <a:t>8.3 Addresses in the Target Code-Static Allocation</a:t>
+            </a:r>
+            <a:endParaRPr lang="zh-CN" altLang="en-US" dirty="0"/>
+          </a:p>
+        </p:txBody>
+      </p:sp>
+      <p:sp>
+        <p:nvSpPr>
+          <p:cNvPr id="5" name="内容占位符 4"/>
+          <p:cNvSpPr>
+            <a:spLocks noGrp="1"/>
+          </p:cNvSpPr>
+          <p:nvPr>
+            <p:ph idx="1"/>
+          </p:nvPr>
+        </p:nvSpPr>
+        <p:spPr>
+          <a:xfrm>
+            <a:off x="828675" y="1600199"/>
+            <a:ext cx="7486650" cy="4672413"/>
+          </a:xfrm>
+        </p:spPr>
+        <p:txBody>
+          <a:bodyPr/>
+          <a:lstStyle/>
+          <a:p>
+            <a:r>
+              <a:rPr lang="en-US" altLang="zh-CN" dirty="0"/>
+              <a:t>code generation for simplified procedure calls and returns, three-address statements</a:t>
+            </a:r>
+            <a:r>
+              <a:rPr lang="en-US" altLang="zh-CN" dirty="0" smtClean="0"/>
+              <a:t>:</a:t>
+            </a:r>
+          </a:p>
+          <a:p>
+            <a:endParaRPr lang="en-US" altLang="zh-CN" dirty="0"/>
+          </a:p>
+          <a:p>
+            <a:endParaRPr lang="en-US" altLang="zh-CN" dirty="0" smtClean="0"/>
+          </a:p>
+          <a:p>
+            <a:r>
+              <a:rPr lang="en-US" altLang="zh-CN" dirty="0"/>
+              <a:t>Here, a </a:t>
+            </a:r>
+            <a:r>
+              <a:rPr lang="en-US" altLang="zh-CN" dirty="0">
+                <a:solidFill>
+                  <a:srgbClr val="7030A0"/>
+                </a:solidFill>
+                <a:latin typeface="Cambria Math" panose="02040503050406030204" pitchFamily="18" charset="0"/>
+                <a:ea typeface="Cambria Math" panose="02040503050406030204" pitchFamily="18" charset="0"/>
+              </a:rPr>
+              <a:t>call </a:t>
+            </a:r>
+            <a:r>
+              <a:rPr lang="en-US" altLang="zh-CN" dirty="0" err="1">
+                <a:solidFill>
+                  <a:srgbClr val="7030A0"/>
+                </a:solidFill>
+                <a:latin typeface="Cambria Math" panose="02040503050406030204" pitchFamily="18" charset="0"/>
+                <a:ea typeface="Cambria Math" panose="02040503050406030204" pitchFamily="18" charset="0"/>
+              </a:rPr>
+              <a:t>callee</a:t>
+            </a:r>
+            <a:r>
+              <a:rPr lang="en-US" altLang="zh-CN" dirty="0">
+                <a:solidFill>
+                  <a:srgbClr val="7030A0"/>
+                </a:solidFill>
+                <a:latin typeface="Cambria Math" panose="02040503050406030204" pitchFamily="18" charset="0"/>
+                <a:ea typeface="Cambria Math" panose="02040503050406030204" pitchFamily="18" charset="0"/>
+              </a:rPr>
+              <a:t> </a:t>
+            </a:r>
+            <a:r>
+              <a:rPr lang="en-US" altLang="zh-CN" dirty="0"/>
+              <a:t>statement in the intermediate code can be </a:t>
+            </a:r>
+            <a:r>
+              <a:rPr lang="en-US" altLang="zh-CN" dirty="0" smtClean="0"/>
+              <a:t>implemented by </a:t>
+            </a:r>
+            <a:r>
+              <a:rPr lang="en-US" altLang="zh-CN" dirty="0"/>
+              <a:t>a sequence of two target-machine </a:t>
+            </a:r>
+            <a:r>
+              <a:rPr lang="en-US" altLang="zh-CN" dirty="0" smtClean="0"/>
+              <a:t>instructions</a:t>
+            </a:r>
+            <a:r>
+              <a:rPr lang="en-US" altLang="zh-CN" dirty="0"/>
+              <a:t>:</a:t>
+            </a:r>
+            <a:endParaRPr lang="en-US" altLang="zh-CN" dirty="0" smtClean="0"/>
+          </a:p>
+          <a:p>
+            <a:endParaRPr lang="zh-CN" altLang="en-US" dirty="0"/>
+          </a:p>
+        </p:txBody>
+      </p:sp>
+      <p:pic>
+        <p:nvPicPr>
+          <p:cNvPr id="3" name="图片 2"/>
+          <p:cNvPicPr>
+            <a:picLocks noChangeAspect="1"/>
+          </p:cNvPicPr>
+          <p:nvPr/>
+        </p:nvPicPr>
+        <p:blipFill>
+          <a:blip r:embed="rId2"/>
+          <a:stretch>
+            <a:fillRect/>
+          </a:stretch>
+        </p:blipFill>
+        <p:spPr>
+          <a:xfrm>
+            <a:off x="2202385" y="1880754"/>
+            <a:ext cx="4557339" cy="1094020"/>
+          </a:xfrm>
+          <a:prstGeom prst="rect">
+            <a:avLst/>
+          </a:prstGeom>
+        </p:spPr>
+      </p:pic>
+      <p:pic>
+        <p:nvPicPr>
+          <p:cNvPr id="4" name="图片 3"/>
+          <p:cNvPicPr>
+            <a:picLocks noChangeAspect="1"/>
+          </p:cNvPicPr>
+          <p:nvPr/>
+        </p:nvPicPr>
+        <p:blipFill>
+          <a:blip r:embed="rId3"/>
+          <a:stretch>
+            <a:fillRect/>
+          </a:stretch>
+        </p:blipFill>
+        <p:spPr>
+          <a:xfrm>
+            <a:off x="2319329" y="3484139"/>
+            <a:ext cx="3226892" cy="555742"/>
+          </a:xfrm>
+          <a:prstGeom prst="rect">
+            <a:avLst/>
+          </a:prstGeom>
+        </p:spPr>
+      </p:pic>
+      <p:pic>
+        <p:nvPicPr>
+          <p:cNvPr id="6" name="图片 5"/>
+          <p:cNvPicPr>
+            <a:picLocks noChangeAspect="1"/>
+          </p:cNvPicPr>
+          <p:nvPr/>
+        </p:nvPicPr>
+        <p:blipFill>
+          <a:blip r:embed="rId4"/>
+          <a:stretch>
+            <a:fillRect/>
+          </a:stretch>
+        </p:blipFill>
+        <p:spPr>
+          <a:xfrm>
+            <a:off x="833648" y="4142015"/>
+            <a:ext cx="7647619" cy="2647619"/>
+          </a:xfrm>
+          <a:prstGeom prst="rect">
+            <a:avLst/>
+          </a:prstGeom>
+        </p:spPr>
+      </p:pic>
+    </p:spTree>
+    <p:extLst>
+      <p:ext uri="{BB962C8B-B14F-4D97-AF65-F5344CB8AC3E}">
+        <p14:creationId xmlns:p14="http://schemas.microsoft.com/office/powerpoint/2010/main" val="3679248542"/>
+      </p:ext>
+    </p:extLst>
+  </p:cSld>
+  <p:clrMapOvr>
+    <a:masterClrMapping/>
+  </p:clrMapOvr>
+  <mc:AlternateContent xmlns:mc="http://schemas.openxmlformats.org/markup-compatibility/2006" xmlns:p14="http://schemas.microsoft.com/office/powerpoint/2010/main">
+    <mc:Choice Requires="p14">
+      <p:transition spd="med" p14:dur="700">
+        <p:fade/>
+      </p:transition>
+    </mc:Choice>
+    <mc:Fallback xmlns="">
+      <p:transition spd="med">
+        <p:fade/>
+      </p:transition>
+    </mc:Fallback>
+  </mc:AlternateContent>
+</p:sld>
+</file>
+
+<file path=ppt/slides/slide15.xml><?xml version="1.0" encoding="utf-8"?>
+<p:sld xmlns:a="http://schemas.openxmlformats.org/drawingml/2006/main" xmlns:r="http://schemas.openxmlformats.org/officeDocument/2006/relationships" xmlns:p="http://schemas.openxmlformats.org/presentationml/2006/main">
+  <p:cSld>
+    <p:spTree>
+      <p:nvGrpSpPr>
+        <p:cNvPr id="1" name=""/>
+        <p:cNvGrpSpPr/>
+        <p:nvPr/>
+      </p:nvGrpSpPr>
+      <p:grpSpPr>
+        <a:xfrm>
+          <a:off x="0" y="0"/>
+          <a:ext cx="0" cy="0"/>
+          <a:chOff x="0" y="0"/>
+          <a:chExt cx="0" cy="0"/>
+        </a:xfrm>
+      </p:grpSpPr>
+      <p:sp>
+        <p:nvSpPr>
+          <p:cNvPr id="2" name="标题 1"/>
+          <p:cNvSpPr>
+            <a:spLocks noGrp="1"/>
+          </p:cNvSpPr>
+          <p:nvPr>
+            <p:ph type="title"/>
+          </p:nvPr>
+        </p:nvSpPr>
+        <p:spPr/>
+        <p:txBody>
+          <a:bodyPr/>
+          <a:lstStyle/>
+          <a:p>
+            <a:r>
+              <a:rPr lang="en-US" altLang="zh-CN" dirty="0"/>
+              <a:t>8.3 Addresses in the Target Code-Static Allocation</a:t>
+            </a:r>
+            <a:endParaRPr lang="zh-CN" altLang="en-US" dirty="0"/>
+          </a:p>
+        </p:txBody>
+      </p:sp>
+      <p:sp>
+        <p:nvSpPr>
+          <p:cNvPr id="5" name="内容占位符 4"/>
+          <p:cNvSpPr>
+            <a:spLocks noGrp="1"/>
+          </p:cNvSpPr>
+          <p:nvPr>
+            <p:ph idx="1"/>
+          </p:nvPr>
+        </p:nvSpPr>
+        <p:spPr>
+          <a:xfrm>
+            <a:off x="828675" y="1600199"/>
+            <a:ext cx="7486650" cy="4672413"/>
+          </a:xfrm>
+        </p:spPr>
+        <p:txBody>
+          <a:bodyPr/>
+          <a:lstStyle/>
+          <a:p>
+            <a:r>
+              <a:rPr lang="en-US" altLang="zh-CN" dirty="0"/>
+              <a:t>A </a:t>
+            </a:r>
+            <a:r>
+              <a:rPr lang="en-US" altLang="zh-CN" dirty="0">
+                <a:solidFill>
+                  <a:srgbClr val="7030A0"/>
+                </a:solidFill>
+                <a:latin typeface="Cambria Math" panose="02040503050406030204" pitchFamily="18" charset="0"/>
+                <a:ea typeface="Cambria Math" panose="02040503050406030204" pitchFamily="18" charset="0"/>
+              </a:rPr>
+              <a:t>return </a:t>
+            </a:r>
+            <a:r>
+              <a:rPr lang="en-US" altLang="zh-CN" dirty="0" err="1">
+                <a:solidFill>
+                  <a:srgbClr val="7030A0"/>
+                </a:solidFill>
+                <a:latin typeface="Cambria Math" panose="02040503050406030204" pitchFamily="18" charset="0"/>
+                <a:ea typeface="Cambria Math" panose="02040503050406030204" pitchFamily="18" charset="0"/>
+              </a:rPr>
+              <a:t>callee</a:t>
+            </a:r>
+            <a:r>
+              <a:rPr lang="en-US" altLang="zh-CN" dirty="0">
+                <a:solidFill>
+                  <a:srgbClr val="7030A0"/>
+                </a:solidFill>
+                <a:latin typeface="Cambria Math" panose="02040503050406030204" pitchFamily="18" charset="0"/>
+                <a:ea typeface="Cambria Math" panose="02040503050406030204" pitchFamily="18" charset="0"/>
+              </a:rPr>
+              <a:t> </a:t>
+            </a:r>
+            <a:r>
+              <a:rPr lang="en-US" altLang="zh-CN" dirty="0"/>
+              <a:t>statement can </a:t>
+            </a:r>
+            <a:r>
+              <a:rPr lang="en-US" altLang="zh-CN" dirty="0" smtClean="0"/>
+              <a:t>be implemented </a:t>
+            </a:r>
+            <a:r>
+              <a:rPr lang="en-US" altLang="zh-CN" dirty="0"/>
+              <a:t>by a simple jump instruction</a:t>
+            </a:r>
+          </a:p>
+          <a:p>
+            <a:endParaRPr lang="en-US" altLang="zh-CN" dirty="0" smtClean="0"/>
+          </a:p>
+          <a:p>
+            <a:r>
+              <a:rPr lang="en-US" altLang="zh-CN" dirty="0"/>
+              <a:t>which transfers control to the address saved at the beginning of the </a:t>
+            </a:r>
+            <a:r>
+              <a:rPr lang="en-US" altLang="zh-CN" dirty="0" smtClean="0"/>
+              <a:t>activation record </a:t>
+            </a:r>
+            <a:r>
+              <a:rPr lang="en-US" altLang="zh-CN" dirty="0"/>
+              <a:t>for </a:t>
+            </a:r>
+            <a:r>
+              <a:rPr lang="en-US" altLang="zh-CN" dirty="0" err="1"/>
+              <a:t>callee</a:t>
+            </a:r>
+            <a:r>
+              <a:rPr lang="en-US" altLang="zh-CN" dirty="0" smtClean="0"/>
+              <a:t>.</a:t>
+            </a:r>
+          </a:p>
+          <a:p>
+            <a:pPr marL="0" indent="0">
+              <a:buNone/>
+            </a:pPr>
+            <a:endParaRPr lang="en-US" altLang="zh-CN" dirty="0"/>
+          </a:p>
+          <a:p>
+            <a:pPr marL="0" indent="0">
+              <a:buNone/>
+            </a:pPr>
+            <a:r>
+              <a:rPr lang="en-US" altLang="zh-CN" dirty="0" smtClean="0"/>
+              <a:t>Example</a:t>
+            </a:r>
+            <a:r>
+              <a:rPr lang="zh-CN" altLang="en-US" dirty="0" smtClean="0"/>
+              <a:t>： </a:t>
+            </a:r>
+            <a:endParaRPr lang="en-US" altLang="zh-CN" dirty="0"/>
+          </a:p>
+        </p:txBody>
+      </p:sp>
+      <p:pic>
+        <p:nvPicPr>
+          <p:cNvPr id="7" name="图片 6"/>
+          <p:cNvPicPr>
+            <a:picLocks noChangeAspect="1"/>
+          </p:cNvPicPr>
+          <p:nvPr/>
+        </p:nvPicPr>
+        <p:blipFill>
+          <a:blip r:embed="rId2"/>
+          <a:stretch>
+            <a:fillRect/>
+          </a:stretch>
+        </p:blipFill>
+        <p:spPr>
+          <a:xfrm>
+            <a:off x="2952405" y="1968134"/>
+            <a:ext cx="2333333" cy="323810"/>
+          </a:xfrm>
+          <a:prstGeom prst="rect">
+            <a:avLst/>
+          </a:prstGeom>
+        </p:spPr>
+      </p:pic>
+      <p:pic>
+        <p:nvPicPr>
+          <p:cNvPr id="8" name="图片 7"/>
+          <p:cNvPicPr>
+            <a:picLocks noChangeAspect="1"/>
+          </p:cNvPicPr>
+          <p:nvPr/>
+        </p:nvPicPr>
+        <p:blipFill>
+          <a:blip r:embed="rId3"/>
+          <a:stretch>
+            <a:fillRect/>
+          </a:stretch>
+        </p:blipFill>
+        <p:spPr>
+          <a:xfrm>
+            <a:off x="589167" y="3741864"/>
+            <a:ext cx="2530948" cy="1958182"/>
+          </a:xfrm>
+          <a:prstGeom prst="rect">
+            <a:avLst/>
+          </a:prstGeom>
+        </p:spPr>
+      </p:pic>
+      <p:pic>
+        <p:nvPicPr>
+          <p:cNvPr id="9" name="图片 8"/>
+          <p:cNvPicPr>
+            <a:picLocks noChangeAspect="1"/>
+          </p:cNvPicPr>
+          <p:nvPr/>
+        </p:nvPicPr>
+        <p:blipFill>
+          <a:blip r:embed="rId4"/>
+          <a:stretch>
+            <a:fillRect/>
+          </a:stretch>
+        </p:blipFill>
+        <p:spPr>
+          <a:xfrm>
+            <a:off x="4582043" y="3119215"/>
+            <a:ext cx="4310801" cy="3129506"/>
+          </a:xfrm>
+          <a:prstGeom prst="rect">
+            <a:avLst/>
+          </a:prstGeom>
+        </p:spPr>
+      </p:pic>
+      <p:sp>
+        <p:nvSpPr>
+          <p:cNvPr id="10" name="右箭头 9"/>
+          <p:cNvSpPr/>
+          <p:nvPr/>
+        </p:nvSpPr>
+        <p:spPr>
+          <a:xfrm>
+            <a:off x="3469593" y="4221622"/>
+            <a:ext cx="709300" cy="393107"/>
+          </a:xfrm>
+          <a:prstGeom prst="rightArrow">
+            <a:avLst/>
+          </a:prstGeom>
+        </p:spPr>
+        <p:style>
+          <a:lnRef idx="2">
+            <a:schemeClr val="accent1">
+              <a:shade val="50000"/>
+            </a:schemeClr>
+          </a:lnRef>
+          <a:fillRef idx="1">
+            <a:schemeClr val="accent1"/>
+          </a:fillRef>
+          <a:effectRef idx="0">
+            <a:schemeClr val="accent1"/>
+          </a:effectRef>
+          <a:fontRef idx="minor">
+            <a:schemeClr val="lt1"/>
+          </a:fontRef>
+        </p:style>
+        <p:txBody>
+          <a:bodyPr rtlCol="0" anchor="ctr"/>
+          <a:lstStyle/>
+          <a:p>
+            <a:pPr algn="ctr"/>
+            <a:endParaRPr lang="zh-CN" altLang="en-US"/>
+          </a:p>
+        </p:txBody>
+      </p:sp>
+    </p:spTree>
+    <p:extLst>
+      <p:ext uri="{BB962C8B-B14F-4D97-AF65-F5344CB8AC3E}">
+        <p14:creationId xmlns:p14="http://schemas.microsoft.com/office/powerpoint/2010/main" val="1362496881"/>
+      </p:ext>
+    </p:extLst>
+  </p:cSld>
+  <p:clrMapOvr>
+    <a:masterClrMapping/>
+  </p:clrMapOvr>
+  <mc:AlternateContent xmlns:mc="http://schemas.openxmlformats.org/markup-compatibility/2006" xmlns:p14="http://schemas.microsoft.com/office/powerpoint/2010/main">
+    <mc:Choice Requires="p14">
+      <p:transition spd="med" p14:dur="700">
+        <p:fade/>
+      </p:transition>
+    </mc:Choice>
+    <mc:Fallback xmlns="">
+      <p:transition spd="med">
+        <p:fade/>
+      </p:transition>
+    </mc:Fallback>
+  </mc:AlternateContent>
+</p:sld>
+</file>
+
 <file path=ppt/slides/slide2.xml><?xml version="1.0" encoding="utf-8"?>
 <p:sld xmlns:a="http://schemas.openxmlformats.org/drawingml/2006/main" xmlns:r="http://schemas.openxmlformats.org/officeDocument/2006/relationships" xmlns:p="http://schemas.openxmlformats.org/presentationml/2006/main">
   <p:cSld>
@@ -5793,7 +6845,6 @@
               <a:rPr lang="en-US" altLang="zh-CN" dirty="0" smtClean="0"/>
               <a:t>Instruction Selection by Tree Rewriting</a:t>
             </a:r>
-            <a:endParaRPr lang="en-US" altLang="zh-CN" dirty="0" smtClean="0"/>
           </a:p>
           <a:p>
             <a:endParaRPr lang="en-US" altLang="zh-CN" dirty="0"/>
@@ -5990,15 +7041,11 @@
             </a:r>
             <a:r>
               <a:rPr lang="en-US" altLang="zh-CN" dirty="0" smtClean="0"/>
-              <a:t> encountered </a:t>
-            </a:r>
-            <a:r>
-              <a:rPr lang="en-US" altLang="zh-CN" dirty="0" err="1"/>
-              <a:t>iIi</a:t>
+              <a:t> encountered in </a:t>
             </a:r>
             <a:r>
               <a:rPr lang="en-US" altLang="zh-CN" dirty="0"/>
-              <a:t> code generation such as register allocation are </a:t>
+              <a:t>code generation such as register allocation are </a:t>
             </a:r>
             <a:r>
               <a:rPr lang="en-US" altLang="zh-CN" dirty="0" smtClean="0"/>
@@ -6945,15 +7992,7 @@
                   <a:srgbClr val="00B0F0"/>
                 </a:solidFill>
               </a:rPr>
-              <a:t>the </a:t>
-            </a:r>
-            <a:r>
-              <a:rPr lang="en-US" altLang="zh-CN" sz="1400" dirty="0">
-                <a:solidFill>
-                  <a:srgbClr val="00B0F0"/>
-                </a:solidFill>
-              </a:rPr>
-              <a:t>desired quality of the generated </a:t>
+              <a:t>the desired quality of the generated </a:t>
             </a:r>
             <a:r>
               <a:rPr lang="en-US" altLang="zh-CN" sz="1400" dirty="0" smtClean="0">
@@ -6977,71 +8016,7 @@
                   <a:schemeClr val="tx2"/>
                 </a:solidFill>
               </a:rPr>
-              <a:t>The quality of the generated code is usually determined by its speed </a:t>
-            </a:r>
-            <a:r>
-              <a:rPr lang="en-US" altLang="zh-CN" sz="1150" dirty="0">
-                <a:solidFill>
-                  <a:schemeClr val="tx2"/>
-                </a:solidFill>
-              </a:rPr>
-              <a:t>and size</a:t>
-            </a:r>
-            <a:r>
-              <a:rPr lang="en-US" altLang="zh-CN" sz="1150" dirty="0">
-                <a:solidFill>
-                  <a:schemeClr val="tx2"/>
-                </a:solidFill>
-              </a:rPr>
-              <a:t>. On most machines, a given IR program can be implemented by </a:t>
-            </a:r>
-            <a:r>
-              <a:rPr lang="en-US" altLang="zh-CN" sz="1150" dirty="0">
-                <a:solidFill>
-                  <a:schemeClr val="tx2"/>
-                </a:solidFill>
-              </a:rPr>
-              <a:t>many different </a:t>
-            </a:r>
-            <a:r>
-              <a:rPr lang="en-US" altLang="zh-CN" sz="1150" dirty="0">
-                <a:solidFill>
-                  <a:schemeClr val="tx2"/>
-                </a:solidFill>
-              </a:rPr>
-              <a:t>code sequences, with significant cost differences between the </a:t>
-            </a:r>
-            <a:r>
-              <a:rPr lang="en-US" altLang="zh-CN" sz="1150" dirty="0">
-                <a:solidFill>
-                  <a:schemeClr val="tx2"/>
-                </a:solidFill>
-              </a:rPr>
-              <a:t>different implementations</a:t>
-            </a:r>
-            <a:r>
-              <a:rPr lang="en-US" altLang="zh-CN" sz="1150" dirty="0">
-                <a:solidFill>
-                  <a:schemeClr val="tx2"/>
-                </a:solidFill>
-              </a:rPr>
-              <a:t>. A naive translation of the intermediate code may </a:t>
-            </a:r>
-            <a:r>
-              <a:rPr lang="en-US" altLang="zh-CN" sz="1150" dirty="0">
-                <a:solidFill>
-                  <a:schemeClr val="tx2"/>
-                </a:solidFill>
-              </a:rPr>
-              <a:t>therefore lead </a:t>
-            </a:r>
-            <a:r>
-              <a:rPr lang="en-US" altLang="zh-CN" sz="1150" dirty="0">
-                <a:solidFill>
-                  <a:schemeClr val="tx2"/>
-                </a:solidFill>
-              </a:rPr>
-              <a:t>to correct but unacceptably inefficient target code.</a:t>
+              <a:t>The quality of the generated code is usually determined by its speed and size. On most machines, a given IR program can be implemented by many different code sequences, with significant cost differences between the different implementations. A naive translation of the intermediate code may therefore lead to correct but unacceptably inefficient target code.</a:t>
             </a:r>
           </a:p>
           <a:p>
@@ -7530,6 +8505,2115 @@
     <p:extLst>
       <p:ext uri="{BB962C8B-B14F-4D97-AF65-F5344CB8AC3E}">
         <p14:creationId xmlns:p14="http://schemas.microsoft.com/office/powerpoint/2010/main" val="1887304773"/>
+      </p:ext>
+    </p:extLst>
+  </p:cSld>
+  <p:clrMapOvr>
+    <a:masterClrMapping/>
+  </p:clrMapOvr>
+  <mc:AlternateContent xmlns:mc="http://schemas.openxmlformats.org/markup-compatibility/2006" xmlns:p14="http://schemas.microsoft.com/office/powerpoint/2010/main">
+    <mc:Choice Requires="p14">
+      <p:transition spd="med" p14:dur="700">
+        <p:fade/>
+      </p:transition>
+    </mc:Choice>
+    <mc:Fallback xmlns="">
+      <p:transition spd="med">
+        <p:fade/>
+      </p:transition>
+    </mc:Fallback>
+  </mc:AlternateContent>
+</p:sld>
+</file>
+
+<file path=ppt/slides/slide8.xml><?xml version="1.0" encoding="utf-8"?>
+<p:sld xmlns:a="http://schemas.openxmlformats.org/drawingml/2006/main" xmlns:r="http://schemas.openxmlformats.org/officeDocument/2006/relationships" xmlns:p="http://schemas.openxmlformats.org/presentationml/2006/main">
+  <p:cSld>
+    <p:spTree>
+      <p:nvGrpSpPr>
+        <p:cNvPr id="1" name=""/>
+        <p:cNvGrpSpPr/>
+        <p:nvPr/>
+      </p:nvGrpSpPr>
+      <p:grpSpPr>
+        <a:xfrm>
+          <a:off x="0" y="0"/>
+          <a:ext cx="0" cy="0"/>
+          <a:chOff x="0" y="0"/>
+          <a:chExt cx="0" cy="0"/>
+        </a:xfrm>
+      </p:grpSpPr>
+      <p:sp>
+        <p:nvSpPr>
+          <p:cNvPr id="2" name="标题 1"/>
+          <p:cNvSpPr>
+            <a:spLocks noGrp="1"/>
+          </p:cNvSpPr>
+          <p:nvPr>
+            <p:ph type="title"/>
+          </p:nvPr>
+        </p:nvSpPr>
+        <p:spPr/>
+        <p:txBody>
+          <a:bodyPr/>
+          <a:lstStyle/>
+          <a:p>
+            <a:r>
+              <a:rPr lang="en-US" altLang="zh-CN" dirty="0" smtClean="0"/>
+              <a:t>8.2 The </a:t>
+            </a:r>
+            <a:r>
+              <a:rPr lang="en-US" altLang="zh-CN" dirty="0"/>
+              <a:t>Target </a:t>
+            </a:r>
+            <a:r>
+              <a:rPr lang="en-US" altLang="zh-CN" dirty="0" smtClean="0"/>
+              <a:t>Language-instructions</a:t>
+            </a:r>
+            <a:endParaRPr lang="zh-CN" altLang="en-US" dirty="0"/>
+          </a:p>
+        </p:txBody>
+      </p:sp>
+      <p:sp>
+        <p:nvSpPr>
+          <p:cNvPr id="3" name="内容占位符 2"/>
+          <p:cNvSpPr>
+            <a:spLocks noGrp="1"/>
+          </p:cNvSpPr>
+          <p:nvPr>
+            <p:ph idx="1"/>
+          </p:nvPr>
+        </p:nvSpPr>
+        <p:spPr/>
+        <p:txBody>
+          <a:bodyPr>
+            <a:normAutofit lnSpcReduction="10000"/>
+          </a:bodyPr>
+          <a:lstStyle/>
+          <a:p>
+            <a:r>
+              <a:rPr lang="en-US" altLang="zh-CN" dirty="0" smtClean="0"/>
+              <a:t>The underlying </a:t>
+            </a:r>
+            <a:r>
+              <a:rPr lang="en-US" altLang="zh-CN" dirty="0"/>
+              <a:t>computer is a byte-addressable machine with n general-purpose </a:t>
+            </a:r>
+            <a:r>
+              <a:rPr lang="en-US" altLang="zh-CN" dirty="0" smtClean="0"/>
+              <a:t>registers</a:t>
+            </a:r>
+            <a:r>
+              <a:rPr lang="en-US" altLang="zh-CN" dirty="0" smtClean="0">
+                <a:solidFill>
+                  <a:srgbClr val="7030A0"/>
+                </a:solidFill>
+                <a:latin typeface="Cambria Math" panose="02040503050406030204" pitchFamily="18" charset="0"/>
+                <a:ea typeface="Cambria Math" panose="02040503050406030204" pitchFamily="18" charset="0"/>
+              </a:rPr>
+              <a:t>, R</a:t>
+            </a:r>
+            <a:r>
+              <a:rPr lang="en-US" altLang="zh-CN" baseline="-25000" dirty="0" smtClean="0">
+                <a:solidFill>
+                  <a:srgbClr val="7030A0"/>
+                </a:solidFill>
+                <a:latin typeface="Cambria Math" panose="02040503050406030204" pitchFamily="18" charset="0"/>
+                <a:ea typeface="Cambria Math" panose="02040503050406030204" pitchFamily="18" charset="0"/>
+              </a:rPr>
+              <a:t>0</a:t>
+            </a:r>
+            <a:r>
+              <a:rPr lang="en-US" altLang="zh-CN" dirty="0" smtClean="0">
+                <a:solidFill>
+                  <a:srgbClr val="7030A0"/>
+                </a:solidFill>
+                <a:latin typeface="Cambria Math" panose="02040503050406030204" pitchFamily="18" charset="0"/>
+                <a:ea typeface="Cambria Math" panose="02040503050406030204" pitchFamily="18" charset="0"/>
+              </a:rPr>
+              <a:t>, R</a:t>
+            </a:r>
+            <a:r>
+              <a:rPr lang="en-US" altLang="zh-CN" baseline="-25000" dirty="0" smtClean="0">
+                <a:solidFill>
+                  <a:srgbClr val="7030A0"/>
+                </a:solidFill>
+                <a:latin typeface="Cambria Math" panose="02040503050406030204" pitchFamily="18" charset="0"/>
+                <a:ea typeface="Cambria Math" panose="02040503050406030204" pitchFamily="18" charset="0"/>
+              </a:rPr>
+              <a:t>1</a:t>
+            </a:r>
+            <a:r>
+              <a:rPr lang="en-US" altLang="zh-CN" dirty="0" smtClean="0">
+                <a:solidFill>
+                  <a:srgbClr val="7030A0"/>
+                </a:solidFill>
+                <a:latin typeface="Cambria Math" panose="02040503050406030204" pitchFamily="18" charset="0"/>
+                <a:ea typeface="Cambria Math" panose="02040503050406030204" pitchFamily="18" charset="0"/>
+              </a:rPr>
+              <a:t>, </a:t>
+            </a:r>
+            <a:r>
+              <a:rPr lang="en-US" altLang="zh-CN" dirty="0">
+                <a:solidFill>
+                  <a:srgbClr val="7030A0"/>
+                </a:solidFill>
+                <a:latin typeface="Cambria Math" panose="02040503050406030204" pitchFamily="18" charset="0"/>
+                <a:ea typeface="Cambria Math" panose="02040503050406030204" pitchFamily="18" charset="0"/>
+              </a:rPr>
+              <a:t>. . . , </a:t>
+            </a:r>
+            <a:r>
+              <a:rPr lang="en-US" altLang="zh-CN" dirty="0" smtClean="0">
+                <a:solidFill>
+                  <a:srgbClr val="7030A0"/>
+                </a:solidFill>
+                <a:latin typeface="Cambria Math" panose="02040503050406030204" pitchFamily="18" charset="0"/>
+                <a:ea typeface="Cambria Math" panose="02040503050406030204" pitchFamily="18" charset="0"/>
+              </a:rPr>
+              <a:t>R</a:t>
+            </a:r>
+            <a:r>
+              <a:rPr lang="en-US" altLang="zh-CN" baseline="-25000" dirty="0" smtClean="0">
+                <a:solidFill>
+                  <a:srgbClr val="7030A0"/>
+                </a:solidFill>
+                <a:latin typeface="Cambria Math" panose="02040503050406030204" pitchFamily="18" charset="0"/>
+                <a:ea typeface="Cambria Math" panose="02040503050406030204" pitchFamily="18" charset="0"/>
+              </a:rPr>
+              <a:t>n-1</a:t>
+            </a:r>
+            <a:r>
+              <a:rPr lang="en-US" altLang="zh-CN" dirty="0"/>
+              <a:t>. We assume </a:t>
+            </a:r>
+            <a:r>
+              <a:rPr lang="en-US" altLang="zh-CN" dirty="0" smtClean="0"/>
+              <a:t>the following </a:t>
+            </a:r>
+            <a:r>
+              <a:rPr lang="en-US" altLang="zh-CN" dirty="0"/>
+              <a:t>kinds of instructions are available</a:t>
+            </a:r>
+            <a:r>
+              <a:rPr lang="en-US" altLang="zh-CN" dirty="0" smtClean="0"/>
+              <a:t>:</a:t>
+            </a:r>
+          </a:p>
+          <a:p>
+            <a:pPr>
+              <a:buFont typeface="Wingdings" panose="05000000000000000000" pitchFamily="2" charset="2"/>
+              <a:buChar char="ü"/>
+            </a:pPr>
+            <a:r>
+              <a:rPr lang="en-US" altLang="zh-CN" dirty="0">
+                <a:solidFill>
+                  <a:srgbClr val="00B0F0"/>
+                </a:solidFill>
+              </a:rPr>
+              <a:t>Load</a:t>
+            </a:r>
+            <a:r>
+              <a:rPr lang="en-US" altLang="zh-CN" dirty="0"/>
+              <a:t> operations:  The instruction </a:t>
+            </a:r>
+            <a:r>
+              <a:rPr lang="en-US" altLang="zh-CN" dirty="0">
+                <a:solidFill>
+                  <a:srgbClr val="7030A0"/>
+                </a:solidFill>
+                <a:latin typeface="Cambria Math" panose="02040503050406030204" pitchFamily="18" charset="0"/>
+                <a:ea typeface="Cambria Math" panose="02040503050406030204" pitchFamily="18" charset="0"/>
+              </a:rPr>
+              <a:t>LD </a:t>
+            </a:r>
+            <a:r>
+              <a:rPr lang="en-US" altLang="zh-CN" dirty="0" err="1">
+                <a:solidFill>
+                  <a:srgbClr val="7030A0"/>
+                </a:solidFill>
+                <a:latin typeface="Cambria Math" panose="02040503050406030204" pitchFamily="18" charset="0"/>
+                <a:ea typeface="Cambria Math" panose="02040503050406030204" pitchFamily="18" charset="0"/>
+              </a:rPr>
+              <a:t>dst</a:t>
+            </a:r>
+            <a:r>
+              <a:rPr lang="en-US" altLang="zh-CN" dirty="0">
+                <a:solidFill>
+                  <a:srgbClr val="7030A0"/>
+                </a:solidFill>
+                <a:latin typeface="Cambria Math" panose="02040503050406030204" pitchFamily="18" charset="0"/>
+                <a:ea typeface="Cambria Math" panose="02040503050406030204" pitchFamily="18" charset="0"/>
+              </a:rPr>
+              <a:t>, </a:t>
+            </a:r>
+            <a:r>
+              <a:rPr lang="en-US" altLang="zh-CN" dirty="0" err="1">
+                <a:solidFill>
+                  <a:srgbClr val="7030A0"/>
+                </a:solidFill>
+                <a:latin typeface="Cambria Math" panose="02040503050406030204" pitchFamily="18" charset="0"/>
+                <a:ea typeface="Cambria Math" panose="02040503050406030204" pitchFamily="18" charset="0"/>
+              </a:rPr>
+              <a:t>addr</a:t>
+            </a:r>
+            <a:r>
+              <a:rPr lang="en-US" altLang="zh-CN" dirty="0">
+                <a:solidFill>
+                  <a:srgbClr val="7030A0"/>
+                </a:solidFill>
+                <a:latin typeface="Cambria Math" panose="02040503050406030204" pitchFamily="18" charset="0"/>
+                <a:ea typeface="Cambria Math" panose="02040503050406030204" pitchFamily="18" charset="0"/>
+              </a:rPr>
+              <a:t> </a:t>
+            </a:r>
+            <a:r>
+              <a:rPr lang="en-US" altLang="zh-CN" dirty="0"/>
+              <a:t>loads the value in </a:t>
+            </a:r>
+            <a:r>
+              <a:rPr lang="en-US" altLang="zh-CN" dirty="0" smtClean="0"/>
+              <a:t>location </a:t>
+            </a:r>
+            <a:r>
+              <a:rPr lang="en-US" altLang="zh-CN" dirty="0" err="1" smtClean="0">
+                <a:solidFill>
+                  <a:srgbClr val="7030A0"/>
+                </a:solidFill>
+                <a:latin typeface="Cambria Math" panose="02040503050406030204" pitchFamily="18" charset="0"/>
+                <a:ea typeface="Cambria Math" panose="02040503050406030204" pitchFamily="18" charset="0"/>
+              </a:rPr>
+              <a:t>addr</a:t>
+            </a:r>
+            <a:r>
+              <a:rPr lang="en-US" altLang="zh-CN" dirty="0" smtClean="0"/>
+              <a:t> </a:t>
+            </a:r>
+            <a:r>
+              <a:rPr lang="en-US" altLang="zh-CN" dirty="0"/>
+              <a:t>into location </a:t>
+            </a:r>
+            <a:r>
+              <a:rPr lang="en-US" altLang="zh-CN" dirty="0" err="1">
+                <a:solidFill>
+                  <a:srgbClr val="7030A0"/>
+                </a:solidFill>
+                <a:latin typeface="Cambria Math" panose="02040503050406030204" pitchFamily="18" charset="0"/>
+                <a:ea typeface="Cambria Math" panose="02040503050406030204" pitchFamily="18" charset="0"/>
+              </a:rPr>
+              <a:t>dst</a:t>
+            </a:r>
+            <a:r>
+              <a:rPr lang="en-US" altLang="zh-CN" dirty="0"/>
+              <a:t>. An instruction of the </a:t>
+            </a:r>
+            <a:r>
+              <a:rPr lang="en-US" altLang="zh-CN" dirty="0" smtClean="0"/>
+              <a:t>form </a:t>
+            </a:r>
+            <a:r>
+              <a:rPr lang="en-US" altLang="zh-CN" dirty="0">
+                <a:solidFill>
+                  <a:srgbClr val="7030A0"/>
+                </a:solidFill>
+                <a:latin typeface="Cambria Math" panose="02040503050406030204" pitchFamily="18" charset="0"/>
+                <a:ea typeface="Cambria Math" panose="02040503050406030204" pitchFamily="18" charset="0"/>
+              </a:rPr>
+              <a:t>LD </a:t>
+            </a:r>
+            <a:r>
+              <a:rPr lang="en-US" altLang="zh-CN" dirty="0" smtClean="0">
+                <a:solidFill>
+                  <a:srgbClr val="7030A0"/>
+                </a:solidFill>
+                <a:latin typeface="Cambria Math" panose="02040503050406030204" pitchFamily="18" charset="0"/>
+                <a:ea typeface="Cambria Math" panose="02040503050406030204" pitchFamily="18" charset="0"/>
+              </a:rPr>
+              <a:t>r</a:t>
+            </a:r>
+            <a:r>
+              <a:rPr lang="en-US" altLang="zh-CN" baseline="-25000" dirty="0" smtClean="0">
+                <a:solidFill>
+                  <a:srgbClr val="7030A0"/>
+                </a:solidFill>
+                <a:latin typeface="Cambria Math" panose="02040503050406030204" pitchFamily="18" charset="0"/>
+                <a:ea typeface="Cambria Math" panose="02040503050406030204" pitchFamily="18" charset="0"/>
+              </a:rPr>
+              <a:t>1</a:t>
+            </a:r>
+            <a:r>
+              <a:rPr lang="en-US" altLang="zh-CN" dirty="0" smtClean="0">
+                <a:solidFill>
+                  <a:srgbClr val="7030A0"/>
+                </a:solidFill>
+                <a:latin typeface="Cambria Math" panose="02040503050406030204" pitchFamily="18" charset="0"/>
+                <a:ea typeface="Cambria Math" panose="02040503050406030204" pitchFamily="18" charset="0"/>
+              </a:rPr>
+              <a:t> </a:t>
+            </a:r>
+            <a:r>
+              <a:rPr lang="en-US" altLang="zh-CN" dirty="0">
+                <a:solidFill>
+                  <a:srgbClr val="7030A0"/>
+                </a:solidFill>
+                <a:latin typeface="Cambria Math" panose="02040503050406030204" pitchFamily="18" charset="0"/>
+                <a:ea typeface="Cambria Math" panose="02040503050406030204" pitchFamily="18" charset="0"/>
+              </a:rPr>
+              <a:t>, </a:t>
+            </a:r>
+            <a:r>
+              <a:rPr lang="en-US" altLang="zh-CN" dirty="0" smtClean="0">
+                <a:solidFill>
+                  <a:srgbClr val="7030A0"/>
+                </a:solidFill>
+                <a:latin typeface="Cambria Math" panose="02040503050406030204" pitchFamily="18" charset="0"/>
+                <a:ea typeface="Cambria Math" panose="02040503050406030204" pitchFamily="18" charset="0"/>
+              </a:rPr>
+              <a:t>r</a:t>
+            </a:r>
+            <a:r>
+              <a:rPr lang="en-US" altLang="zh-CN" baseline="-25000" dirty="0" smtClean="0">
+                <a:solidFill>
+                  <a:srgbClr val="7030A0"/>
+                </a:solidFill>
+                <a:latin typeface="Cambria Math" panose="02040503050406030204" pitchFamily="18" charset="0"/>
+                <a:ea typeface="Cambria Math" panose="02040503050406030204" pitchFamily="18" charset="0"/>
+              </a:rPr>
+              <a:t>2</a:t>
+            </a:r>
+            <a:r>
+              <a:rPr lang="en-US" altLang="zh-CN" dirty="0" smtClean="0">
+                <a:solidFill>
+                  <a:srgbClr val="7030A0"/>
+                </a:solidFill>
+                <a:latin typeface="Cambria Math" panose="02040503050406030204" pitchFamily="18" charset="0"/>
+                <a:ea typeface="Cambria Math" panose="02040503050406030204" pitchFamily="18" charset="0"/>
+              </a:rPr>
+              <a:t> </a:t>
+            </a:r>
+            <a:r>
+              <a:rPr lang="en-US" altLang="zh-CN" dirty="0"/>
+              <a:t>is </a:t>
+            </a:r>
+            <a:r>
+              <a:rPr lang="en-US" altLang="zh-CN" dirty="0" smtClean="0"/>
+              <a:t>a register-to-register </a:t>
+            </a:r>
+            <a:r>
+              <a:rPr lang="en-US" altLang="zh-CN" dirty="0"/>
+              <a:t>copy in which the contents of register </a:t>
+            </a:r>
+            <a:r>
+              <a:rPr lang="en-US" altLang="zh-CN" dirty="0">
+                <a:solidFill>
+                  <a:srgbClr val="7030A0"/>
+                </a:solidFill>
+                <a:latin typeface="Cambria Math" panose="02040503050406030204" pitchFamily="18" charset="0"/>
+                <a:ea typeface="Cambria Math" panose="02040503050406030204" pitchFamily="18" charset="0"/>
+              </a:rPr>
+              <a:t>r</a:t>
+            </a:r>
+            <a:r>
+              <a:rPr lang="en-US" altLang="zh-CN" baseline="-25000" dirty="0">
+                <a:solidFill>
+                  <a:srgbClr val="7030A0"/>
+                </a:solidFill>
+                <a:latin typeface="Cambria Math" panose="02040503050406030204" pitchFamily="18" charset="0"/>
+                <a:ea typeface="Cambria Math" panose="02040503050406030204" pitchFamily="18" charset="0"/>
+              </a:rPr>
+              <a:t>1</a:t>
+            </a:r>
+            <a:r>
+              <a:rPr lang="en-US" altLang="zh-CN" dirty="0" smtClean="0"/>
+              <a:t> </a:t>
+            </a:r>
+            <a:r>
+              <a:rPr lang="en-US" altLang="zh-CN" dirty="0"/>
+              <a:t>are </a:t>
+            </a:r>
+            <a:r>
+              <a:rPr lang="en-US" altLang="zh-CN" dirty="0" smtClean="0"/>
+              <a:t>copied into </a:t>
+            </a:r>
+            <a:r>
+              <a:rPr lang="en-US" altLang="zh-CN" dirty="0"/>
+              <a:t>register </a:t>
+            </a:r>
+            <a:r>
+              <a:rPr lang="en-US" altLang="zh-CN" dirty="0">
+                <a:solidFill>
+                  <a:srgbClr val="7030A0"/>
+                </a:solidFill>
+                <a:latin typeface="Cambria Math" panose="02040503050406030204" pitchFamily="18" charset="0"/>
+                <a:ea typeface="Cambria Math" panose="02040503050406030204" pitchFamily="18" charset="0"/>
+              </a:rPr>
+              <a:t>r</a:t>
+            </a:r>
+            <a:r>
+              <a:rPr lang="en-US" altLang="zh-CN" baseline="-25000" dirty="0">
+                <a:solidFill>
+                  <a:srgbClr val="7030A0"/>
+                </a:solidFill>
+                <a:latin typeface="Cambria Math" panose="02040503050406030204" pitchFamily="18" charset="0"/>
+                <a:ea typeface="Cambria Math" panose="02040503050406030204" pitchFamily="18" charset="0"/>
+              </a:rPr>
+              <a:t>2</a:t>
+            </a:r>
+            <a:r>
+              <a:rPr lang="en-US" altLang="zh-CN" dirty="0" smtClean="0"/>
+              <a:t>.</a:t>
+            </a:r>
+          </a:p>
+          <a:p>
+            <a:pPr>
+              <a:buFont typeface="Wingdings" panose="05000000000000000000" pitchFamily="2" charset="2"/>
+              <a:buChar char="ü"/>
+            </a:pPr>
+            <a:r>
+              <a:rPr lang="en-US" altLang="zh-CN" dirty="0">
+                <a:solidFill>
+                  <a:srgbClr val="00B0F0"/>
+                </a:solidFill>
+              </a:rPr>
+              <a:t>Store</a:t>
+            </a:r>
+            <a:r>
+              <a:rPr lang="en-US" altLang="zh-CN" dirty="0"/>
+              <a:t> operations: The instruction </a:t>
+            </a:r>
+            <a:r>
+              <a:rPr lang="en-US" altLang="zh-CN" dirty="0" smtClean="0">
+                <a:solidFill>
+                  <a:srgbClr val="7030A0"/>
+                </a:solidFill>
+                <a:latin typeface="Cambria Math" panose="02040503050406030204" pitchFamily="18" charset="0"/>
+                <a:ea typeface="Cambria Math" panose="02040503050406030204" pitchFamily="18" charset="0"/>
+              </a:rPr>
+              <a:t>ST </a:t>
+            </a:r>
+            <a:r>
+              <a:rPr lang="en-US" altLang="zh-CN" dirty="0">
+                <a:solidFill>
+                  <a:srgbClr val="7030A0"/>
+                </a:solidFill>
+                <a:latin typeface="Cambria Math" panose="02040503050406030204" pitchFamily="18" charset="0"/>
+                <a:ea typeface="Cambria Math" panose="02040503050406030204" pitchFamily="18" charset="0"/>
+              </a:rPr>
+              <a:t>x, r </a:t>
+            </a:r>
+            <a:r>
+              <a:rPr lang="en-US" altLang="zh-CN" dirty="0"/>
+              <a:t>stores the value in register </a:t>
+            </a:r>
+            <a:r>
+              <a:rPr lang="en-US" altLang="zh-CN" dirty="0">
+                <a:solidFill>
+                  <a:srgbClr val="7030A0"/>
+                </a:solidFill>
+                <a:latin typeface="Cambria Math" panose="02040503050406030204" pitchFamily="18" charset="0"/>
+                <a:ea typeface="Cambria Math" panose="02040503050406030204" pitchFamily="18" charset="0"/>
+              </a:rPr>
+              <a:t>r</a:t>
+            </a:r>
+            <a:r>
+              <a:rPr lang="en-US" altLang="zh-CN" dirty="0"/>
+              <a:t> </a:t>
+            </a:r>
+            <a:r>
+              <a:rPr lang="en-US" altLang="zh-CN" dirty="0" smtClean="0"/>
+              <a:t>into the </a:t>
+            </a:r>
+            <a:r>
+              <a:rPr lang="en-US" altLang="zh-CN" dirty="0"/>
+              <a:t>location </a:t>
+            </a:r>
+            <a:r>
+              <a:rPr lang="en-US" altLang="zh-CN" dirty="0">
+                <a:solidFill>
+                  <a:srgbClr val="7030A0"/>
+                </a:solidFill>
+                <a:latin typeface="Cambria Math" panose="02040503050406030204" pitchFamily="18" charset="0"/>
+                <a:ea typeface="Cambria Math" panose="02040503050406030204" pitchFamily="18" charset="0"/>
+              </a:rPr>
+              <a:t>x</a:t>
+            </a:r>
+            <a:r>
+              <a:rPr lang="en-US" altLang="zh-CN" dirty="0" smtClean="0"/>
+              <a:t>.</a:t>
+            </a:r>
+          </a:p>
+          <a:p>
+            <a:pPr>
+              <a:buFont typeface="Wingdings" panose="05000000000000000000" pitchFamily="2" charset="2"/>
+              <a:buChar char="ü"/>
+            </a:pPr>
+            <a:r>
+              <a:rPr lang="en-US" altLang="zh-CN" dirty="0">
+                <a:solidFill>
+                  <a:srgbClr val="00B0F0"/>
+                </a:solidFill>
+              </a:rPr>
+              <a:t>Computation</a:t>
+            </a:r>
+            <a:r>
+              <a:rPr lang="en-US" altLang="zh-CN" dirty="0"/>
+              <a:t> operations of the form </a:t>
+            </a:r>
+            <a:r>
+              <a:rPr lang="en-US" altLang="zh-CN" dirty="0" smtClean="0">
+                <a:solidFill>
+                  <a:srgbClr val="7030A0"/>
+                </a:solidFill>
+                <a:latin typeface="Cambria Math" panose="02040503050406030204" pitchFamily="18" charset="0"/>
+                <a:ea typeface="Cambria Math" panose="02040503050406030204" pitchFamily="18" charset="0"/>
+              </a:rPr>
+              <a:t>OP </a:t>
+            </a:r>
+            <a:r>
+              <a:rPr lang="en-US" altLang="zh-CN" dirty="0" err="1">
+                <a:solidFill>
+                  <a:srgbClr val="7030A0"/>
+                </a:solidFill>
+                <a:latin typeface="Cambria Math" panose="02040503050406030204" pitchFamily="18" charset="0"/>
+                <a:ea typeface="Cambria Math" panose="02040503050406030204" pitchFamily="18" charset="0"/>
+              </a:rPr>
+              <a:t>dst</a:t>
+            </a:r>
+            <a:r>
+              <a:rPr lang="en-US" altLang="zh-CN" dirty="0">
+                <a:solidFill>
+                  <a:srgbClr val="7030A0"/>
+                </a:solidFill>
+                <a:latin typeface="Cambria Math" panose="02040503050406030204" pitchFamily="18" charset="0"/>
+                <a:ea typeface="Cambria Math" panose="02040503050406030204" pitchFamily="18" charset="0"/>
+              </a:rPr>
+              <a:t>, </a:t>
+            </a:r>
+            <a:r>
+              <a:rPr lang="en-US" altLang="zh-CN" dirty="0" smtClean="0">
+                <a:solidFill>
+                  <a:srgbClr val="7030A0"/>
+                </a:solidFill>
+                <a:latin typeface="Cambria Math" panose="02040503050406030204" pitchFamily="18" charset="0"/>
+                <a:ea typeface="Cambria Math" panose="02040503050406030204" pitchFamily="18" charset="0"/>
+              </a:rPr>
+              <a:t>src</a:t>
+            </a:r>
+            <a:r>
+              <a:rPr lang="en-US" altLang="zh-CN" baseline="-25000" dirty="0" smtClean="0">
+                <a:solidFill>
+                  <a:srgbClr val="7030A0"/>
+                </a:solidFill>
+                <a:latin typeface="Cambria Math" panose="02040503050406030204" pitchFamily="18" charset="0"/>
+                <a:ea typeface="Cambria Math" panose="02040503050406030204" pitchFamily="18" charset="0"/>
+              </a:rPr>
+              <a:t>1</a:t>
+            </a:r>
+            <a:r>
+              <a:rPr lang="en-US" altLang="zh-CN" dirty="0" smtClean="0">
+                <a:solidFill>
+                  <a:srgbClr val="7030A0"/>
+                </a:solidFill>
+                <a:latin typeface="Cambria Math" panose="02040503050406030204" pitchFamily="18" charset="0"/>
+                <a:ea typeface="Cambria Math" panose="02040503050406030204" pitchFamily="18" charset="0"/>
+              </a:rPr>
+              <a:t> </a:t>
+            </a:r>
+            <a:r>
+              <a:rPr lang="en-US" altLang="zh-CN" dirty="0">
+                <a:solidFill>
+                  <a:srgbClr val="7030A0"/>
+                </a:solidFill>
+                <a:latin typeface="Cambria Math" panose="02040503050406030204" pitchFamily="18" charset="0"/>
+                <a:ea typeface="Cambria Math" panose="02040503050406030204" pitchFamily="18" charset="0"/>
+              </a:rPr>
+              <a:t>, </a:t>
+            </a:r>
+            <a:r>
+              <a:rPr lang="en-US" altLang="zh-CN" dirty="0" smtClean="0">
+                <a:solidFill>
+                  <a:srgbClr val="7030A0"/>
+                </a:solidFill>
+                <a:latin typeface="Cambria Math" panose="02040503050406030204" pitchFamily="18" charset="0"/>
+                <a:ea typeface="Cambria Math" panose="02040503050406030204" pitchFamily="18" charset="0"/>
+              </a:rPr>
+              <a:t>src</a:t>
+            </a:r>
+            <a:r>
+              <a:rPr lang="en-US" altLang="zh-CN" baseline="-25000" dirty="0" smtClean="0">
+                <a:solidFill>
+                  <a:srgbClr val="7030A0"/>
+                </a:solidFill>
+                <a:latin typeface="Cambria Math" panose="02040503050406030204" pitchFamily="18" charset="0"/>
+                <a:ea typeface="Cambria Math" panose="02040503050406030204" pitchFamily="18" charset="0"/>
+              </a:rPr>
+              <a:t>2</a:t>
+            </a:r>
+            <a:r>
+              <a:rPr lang="en-US" altLang="zh-CN" dirty="0" smtClean="0">
+                <a:solidFill>
+                  <a:srgbClr val="7030A0"/>
+                </a:solidFill>
+                <a:latin typeface="Cambria Math" panose="02040503050406030204" pitchFamily="18" charset="0"/>
+                <a:ea typeface="Cambria Math" panose="02040503050406030204" pitchFamily="18" charset="0"/>
+              </a:rPr>
+              <a:t> </a:t>
+            </a:r>
+            <a:r>
+              <a:rPr lang="en-US" altLang="zh-CN" dirty="0"/>
+              <a:t>, where </a:t>
+            </a:r>
+            <a:r>
+              <a:rPr lang="en-US" altLang="zh-CN" dirty="0">
+                <a:latin typeface="Cambria Math" panose="02040503050406030204" pitchFamily="18" charset="0"/>
+                <a:ea typeface="Cambria Math" panose="02040503050406030204" pitchFamily="18" charset="0"/>
+              </a:rPr>
+              <a:t>OP</a:t>
+            </a:r>
+            <a:r>
+              <a:rPr lang="en-US" altLang="zh-CN" dirty="0" smtClean="0"/>
+              <a:t> </a:t>
+            </a:r>
+            <a:r>
+              <a:rPr lang="en-US" altLang="zh-CN" dirty="0"/>
+              <a:t>is a </a:t>
+            </a:r>
+            <a:r>
+              <a:rPr lang="en-US" altLang="zh-CN" dirty="0" smtClean="0"/>
+              <a:t>operator like </a:t>
+            </a:r>
+            <a:r>
+              <a:rPr lang="en-US" altLang="zh-CN" dirty="0">
+                <a:solidFill>
+                  <a:srgbClr val="7030A0"/>
+                </a:solidFill>
+                <a:latin typeface="Cambria Math" panose="02040503050406030204" pitchFamily="18" charset="0"/>
+                <a:ea typeface="Cambria Math" panose="02040503050406030204" pitchFamily="18" charset="0"/>
+              </a:rPr>
+              <a:t>ADD</a:t>
+            </a:r>
+            <a:r>
+              <a:rPr lang="en-US" altLang="zh-CN" dirty="0"/>
+              <a:t> or </a:t>
+            </a:r>
+            <a:r>
+              <a:rPr lang="en-US" altLang="zh-CN" dirty="0">
+                <a:solidFill>
+                  <a:srgbClr val="7030A0"/>
+                </a:solidFill>
+                <a:latin typeface="Cambria Math" panose="02040503050406030204" pitchFamily="18" charset="0"/>
+                <a:ea typeface="Cambria Math" panose="02040503050406030204" pitchFamily="18" charset="0"/>
+              </a:rPr>
+              <a:t>SUB</a:t>
+            </a:r>
+            <a:r>
+              <a:rPr lang="en-US" altLang="zh-CN" dirty="0"/>
+              <a:t>, and </a:t>
+            </a:r>
+            <a:r>
+              <a:rPr lang="en-US" altLang="zh-CN" dirty="0" err="1">
+                <a:solidFill>
+                  <a:srgbClr val="7030A0"/>
+                </a:solidFill>
+                <a:latin typeface="Cambria Math" panose="02040503050406030204" pitchFamily="18" charset="0"/>
+                <a:ea typeface="Cambria Math" panose="02040503050406030204" pitchFamily="18" charset="0"/>
+              </a:rPr>
+              <a:t>dst</a:t>
+            </a:r>
+            <a:r>
+              <a:rPr lang="en-US" altLang="zh-CN" dirty="0" smtClean="0">
+                <a:solidFill>
+                  <a:srgbClr val="7030A0"/>
+                </a:solidFill>
+              </a:rPr>
+              <a:t>, </a:t>
+            </a:r>
+            <a:r>
+              <a:rPr lang="en-US" altLang="zh-CN" dirty="0">
+                <a:solidFill>
+                  <a:srgbClr val="7030A0"/>
+                </a:solidFill>
+                <a:latin typeface="Cambria Math" panose="02040503050406030204" pitchFamily="18" charset="0"/>
+                <a:ea typeface="Cambria Math" panose="02040503050406030204" pitchFamily="18" charset="0"/>
+              </a:rPr>
+              <a:t>src</a:t>
+            </a:r>
+            <a:r>
+              <a:rPr lang="en-US" altLang="zh-CN" baseline="-25000" dirty="0">
+                <a:solidFill>
+                  <a:srgbClr val="7030A0"/>
+                </a:solidFill>
+                <a:latin typeface="Cambria Math" panose="02040503050406030204" pitchFamily="18" charset="0"/>
+                <a:ea typeface="Cambria Math" panose="02040503050406030204" pitchFamily="18" charset="0"/>
+              </a:rPr>
+              <a:t>1</a:t>
+            </a:r>
+            <a:r>
+              <a:rPr lang="en-US" altLang="zh-CN" dirty="0">
+                <a:solidFill>
+                  <a:srgbClr val="7030A0"/>
+                </a:solidFill>
+                <a:latin typeface="Cambria Math" panose="02040503050406030204" pitchFamily="18" charset="0"/>
+                <a:ea typeface="Cambria Math" panose="02040503050406030204" pitchFamily="18" charset="0"/>
+              </a:rPr>
+              <a:t> </a:t>
+            </a:r>
+            <a:r>
+              <a:rPr lang="en-US" altLang="zh-CN" dirty="0" smtClean="0"/>
+              <a:t>, </a:t>
+            </a:r>
+            <a:r>
+              <a:rPr lang="en-US" altLang="zh-CN" dirty="0"/>
+              <a:t>and </a:t>
+            </a:r>
+            <a:r>
+              <a:rPr lang="en-US" altLang="zh-CN" dirty="0">
+                <a:solidFill>
+                  <a:srgbClr val="7030A0"/>
+                </a:solidFill>
+                <a:latin typeface="Cambria Math" panose="02040503050406030204" pitchFamily="18" charset="0"/>
+                <a:ea typeface="Cambria Math" panose="02040503050406030204" pitchFamily="18" charset="0"/>
+              </a:rPr>
+              <a:t>src</a:t>
+            </a:r>
+            <a:r>
+              <a:rPr lang="en-US" altLang="zh-CN" baseline="-25000" dirty="0">
+                <a:solidFill>
+                  <a:srgbClr val="7030A0"/>
+                </a:solidFill>
+                <a:latin typeface="Cambria Math" panose="02040503050406030204" pitchFamily="18" charset="0"/>
+                <a:ea typeface="Cambria Math" panose="02040503050406030204" pitchFamily="18" charset="0"/>
+              </a:rPr>
+              <a:t>2</a:t>
+            </a:r>
+            <a:r>
+              <a:rPr lang="en-US" altLang="zh-CN" dirty="0">
+                <a:latin typeface="Cambria Math" panose="02040503050406030204" pitchFamily="18" charset="0"/>
+                <a:ea typeface="Cambria Math" panose="02040503050406030204" pitchFamily="18" charset="0"/>
+              </a:rPr>
+              <a:t> </a:t>
+            </a:r>
+            <a:r>
+              <a:rPr lang="en-US" altLang="zh-CN" dirty="0" smtClean="0"/>
+              <a:t>are locations. The </a:t>
+            </a:r>
+            <a:r>
+              <a:rPr lang="en-US" altLang="zh-CN" dirty="0"/>
+              <a:t>effect of this machine instruction is to apply the </a:t>
+            </a:r>
+            <a:r>
+              <a:rPr lang="en-US" altLang="zh-CN" dirty="0" smtClean="0"/>
+              <a:t>operation represented </a:t>
+            </a:r>
+            <a:r>
+              <a:rPr lang="en-US" altLang="zh-CN" dirty="0"/>
+              <a:t>by </a:t>
+            </a:r>
+            <a:r>
+              <a:rPr lang="en-US" altLang="zh-CN" dirty="0">
+                <a:solidFill>
+                  <a:srgbClr val="7030A0"/>
+                </a:solidFill>
+                <a:latin typeface="Cambria Math" panose="02040503050406030204" pitchFamily="18" charset="0"/>
+                <a:ea typeface="Cambria Math" panose="02040503050406030204" pitchFamily="18" charset="0"/>
+              </a:rPr>
+              <a:t>OP</a:t>
+            </a:r>
+            <a:r>
+              <a:rPr lang="en-US" altLang="zh-CN" dirty="0">
+                <a:latin typeface="Cambria Math" panose="02040503050406030204" pitchFamily="18" charset="0"/>
+                <a:ea typeface="Cambria Math" panose="02040503050406030204" pitchFamily="18" charset="0"/>
+              </a:rPr>
+              <a:t> </a:t>
+            </a:r>
+            <a:r>
+              <a:rPr lang="en-US" altLang="zh-CN" dirty="0" smtClean="0"/>
+              <a:t>to </a:t>
+            </a:r>
+            <a:r>
+              <a:rPr lang="en-US" altLang="zh-CN" dirty="0"/>
+              <a:t>the values in locations </a:t>
+            </a:r>
+            <a:r>
+              <a:rPr lang="en-US" altLang="zh-CN" dirty="0">
+                <a:solidFill>
+                  <a:srgbClr val="7030A0"/>
+                </a:solidFill>
+                <a:latin typeface="Cambria Math" panose="02040503050406030204" pitchFamily="18" charset="0"/>
+                <a:ea typeface="Cambria Math" panose="02040503050406030204" pitchFamily="18" charset="0"/>
+              </a:rPr>
+              <a:t>src</a:t>
+            </a:r>
+            <a:r>
+              <a:rPr lang="en-US" altLang="zh-CN" baseline="-25000" dirty="0">
+                <a:solidFill>
+                  <a:srgbClr val="7030A0"/>
+                </a:solidFill>
+                <a:latin typeface="Cambria Math" panose="02040503050406030204" pitchFamily="18" charset="0"/>
+                <a:ea typeface="Cambria Math" panose="02040503050406030204" pitchFamily="18" charset="0"/>
+              </a:rPr>
+              <a:t>1</a:t>
+            </a:r>
+            <a:r>
+              <a:rPr lang="en-US" altLang="zh-CN" dirty="0">
+                <a:latin typeface="Cambria Math" panose="02040503050406030204" pitchFamily="18" charset="0"/>
+                <a:ea typeface="Cambria Math" panose="02040503050406030204" pitchFamily="18" charset="0"/>
+              </a:rPr>
+              <a:t> </a:t>
+            </a:r>
+            <a:r>
+              <a:rPr lang="en-US" altLang="zh-CN" dirty="0" smtClean="0"/>
+              <a:t>and </a:t>
+            </a:r>
+            <a:r>
+              <a:rPr lang="en-US" altLang="zh-CN" dirty="0">
+                <a:solidFill>
+                  <a:srgbClr val="7030A0"/>
+                </a:solidFill>
+                <a:latin typeface="Cambria Math" panose="02040503050406030204" pitchFamily="18" charset="0"/>
+                <a:ea typeface="Cambria Math" panose="02040503050406030204" pitchFamily="18" charset="0"/>
+              </a:rPr>
+              <a:t>src</a:t>
+            </a:r>
+            <a:r>
+              <a:rPr lang="en-US" altLang="zh-CN" baseline="-25000" dirty="0">
+                <a:solidFill>
+                  <a:srgbClr val="7030A0"/>
+                </a:solidFill>
+                <a:latin typeface="Cambria Math" panose="02040503050406030204" pitchFamily="18" charset="0"/>
+                <a:ea typeface="Cambria Math" panose="02040503050406030204" pitchFamily="18" charset="0"/>
+              </a:rPr>
+              <a:t>2</a:t>
+            </a:r>
+            <a:r>
+              <a:rPr lang="en-US" altLang="zh-CN" dirty="0">
+                <a:solidFill>
+                  <a:srgbClr val="7030A0"/>
+                </a:solidFill>
+                <a:latin typeface="Cambria Math" panose="02040503050406030204" pitchFamily="18" charset="0"/>
+                <a:ea typeface="Cambria Math" panose="02040503050406030204" pitchFamily="18" charset="0"/>
+              </a:rPr>
+              <a:t> </a:t>
+            </a:r>
+            <a:r>
+              <a:rPr lang="en-US" altLang="zh-CN" dirty="0" smtClean="0"/>
+              <a:t>, </a:t>
+            </a:r>
+            <a:r>
+              <a:rPr lang="en-US" altLang="zh-CN" dirty="0"/>
+              <a:t>and place </a:t>
+            </a:r>
+            <a:r>
+              <a:rPr lang="en-US" altLang="zh-CN" dirty="0" smtClean="0"/>
+              <a:t>the result </a:t>
+            </a:r>
+            <a:r>
+              <a:rPr lang="en-US" altLang="zh-CN" dirty="0"/>
+              <a:t>of this operation in location </a:t>
+            </a:r>
+            <a:r>
+              <a:rPr lang="en-US" altLang="zh-CN" dirty="0" err="1">
+                <a:solidFill>
+                  <a:srgbClr val="7030A0"/>
+                </a:solidFill>
+                <a:latin typeface="Cambria Math" panose="02040503050406030204" pitchFamily="18" charset="0"/>
+                <a:ea typeface="Cambria Math" panose="02040503050406030204" pitchFamily="18" charset="0"/>
+              </a:rPr>
+              <a:t>dst</a:t>
+            </a:r>
+            <a:r>
+              <a:rPr lang="en-US" altLang="zh-CN" dirty="0" smtClean="0"/>
+              <a:t>.</a:t>
+            </a:r>
+          </a:p>
+          <a:p>
+            <a:pPr>
+              <a:buFont typeface="Wingdings" panose="05000000000000000000" pitchFamily="2" charset="2"/>
+              <a:buChar char="ü"/>
+            </a:pPr>
+            <a:r>
+              <a:rPr lang="en-US" altLang="zh-CN" dirty="0">
+                <a:solidFill>
+                  <a:srgbClr val="00B0F0"/>
+                </a:solidFill>
+              </a:rPr>
+              <a:t>Unconditional jumps</a:t>
+            </a:r>
+            <a:r>
+              <a:rPr lang="en-US" altLang="zh-CN" dirty="0"/>
+              <a:t>: The instruction </a:t>
+            </a:r>
+            <a:r>
+              <a:rPr lang="en-US" altLang="zh-CN" dirty="0">
+                <a:solidFill>
+                  <a:srgbClr val="7030A0"/>
+                </a:solidFill>
+                <a:latin typeface="Cambria Math" panose="02040503050406030204" pitchFamily="18" charset="0"/>
+                <a:ea typeface="Cambria Math" panose="02040503050406030204" pitchFamily="18" charset="0"/>
+              </a:rPr>
+              <a:t>BR</a:t>
+            </a:r>
+            <a:r>
+              <a:rPr lang="en-US" altLang="zh-CN" dirty="0">
+                <a:latin typeface="Cambria Math" panose="02040503050406030204" pitchFamily="18" charset="0"/>
+                <a:ea typeface="Cambria Math" panose="02040503050406030204" pitchFamily="18" charset="0"/>
+              </a:rPr>
+              <a:t> </a:t>
+            </a:r>
+            <a:r>
+              <a:rPr lang="en-US" altLang="zh-CN" dirty="0">
+                <a:solidFill>
+                  <a:srgbClr val="7030A0"/>
+                </a:solidFill>
+                <a:latin typeface="Cambria Math" panose="02040503050406030204" pitchFamily="18" charset="0"/>
+                <a:ea typeface="Cambria Math" panose="02040503050406030204" pitchFamily="18" charset="0"/>
+              </a:rPr>
+              <a:t>L</a:t>
+            </a:r>
+            <a:r>
+              <a:rPr lang="en-US" altLang="zh-CN" dirty="0">
+                <a:latin typeface="Cambria Math" panose="02040503050406030204" pitchFamily="18" charset="0"/>
+                <a:ea typeface="Cambria Math" panose="02040503050406030204" pitchFamily="18" charset="0"/>
+              </a:rPr>
+              <a:t> </a:t>
+            </a:r>
+            <a:r>
+              <a:rPr lang="en-US" altLang="zh-CN" dirty="0"/>
+              <a:t>causes control to branch </a:t>
+            </a:r>
+            <a:r>
+              <a:rPr lang="en-US" altLang="zh-CN" dirty="0" smtClean="0"/>
+              <a:t>to the </a:t>
+            </a:r>
+            <a:r>
+              <a:rPr lang="en-US" altLang="zh-CN" dirty="0"/>
+              <a:t>machine instruction with label </a:t>
+            </a:r>
+            <a:r>
+              <a:rPr lang="en-US" altLang="zh-CN" dirty="0">
+                <a:solidFill>
+                  <a:srgbClr val="7030A0"/>
+                </a:solidFill>
+                <a:latin typeface="Cambria Math" panose="02040503050406030204" pitchFamily="18" charset="0"/>
+                <a:ea typeface="Cambria Math" panose="02040503050406030204" pitchFamily="18" charset="0"/>
+              </a:rPr>
+              <a:t>L</a:t>
+            </a:r>
+            <a:r>
+              <a:rPr lang="en-US" altLang="zh-CN" dirty="0"/>
+              <a:t>. (</a:t>
+            </a:r>
+            <a:r>
+              <a:rPr lang="en-US" altLang="zh-CN" dirty="0">
+                <a:solidFill>
+                  <a:srgbClr val="7030A0"/>
+                </a:solidFill>
+                <a:latin typeface="Cambria Math" panose="02040503050406030204" pitchFamily="18" charset="0"/>
+                <a:ea typeface="Cambria Math" panose="02040503050406030204" pitchFamily="18" charset="0"/>
+              </a:rPr>
+              <a:t>BR</a:t>
+            </a:r>
+            <a:r>
+              <a:rPr lang="en-US" altLang="zh-CN" dirty="0">
+                <a:solidFill>
+                  <a:srgbClr val="7030A0"/>
+                </a:solidFill>
+              </a:rPr>
+              <a:t> </a:t>
+            </a:r>
+            <a:r>
+              <a:rPr lang="en-US" altLang="zh-CN" dirty="0"/>
+              <a:t>stands for branch.)</a:t>
+            </a:r>
+            <a:endParaRPr lang="en-US" altLang="zh-CN" dirty="0" smtClean="0"/>
+          </a:p>
+          <a:p>
+            <a:pPr>
+              <a:buFont typeface="Wingdings" panose="05000000000000000000" pitchFamily="2" charset="2"/>
+              <a:buChar char="ü"/>
+            </a:pPr>
+            <a:r>
+              <a:rPr lang="en-US" altLang="zh-CN" dirty="0">
+                <a:solidFill>
+                  <a:srgbClr val="00B0F0"/>
+                </a:solidFill>
+              </a:rPr>
+              <a:t>Conditional jumps </a:t>
+            </a:r>
+            <a:r>
+              <a:rPr lang="en-US" altLang="zh-CN" dirty="0"/>
+              <a:t>of the form </a:t>
+            </a:r>
+            <a:r>
+              <a:rPr lang="en-US" altLang="zh-CN" dirty="0" err="1">
+                <a:solidFill>
+                  <a:srgbClr val="7030A0"/>
+                </a:solidFill>
+                <a:latin typeface="Cambria Math" panose="02040503050406030204" pitchFamily="18" charset="0"/>
+                <a:ea typeface="Cambria Math" panose="02040503050406030204" pitchFamily="18" charset="0"/>
+              </a:rPr>
+              <a:t>Bcond</a:t>
+            </a:r>
+            <a:r>
+              <a:rPr lang="en-US" altLang="zh-CN" dirty="0">
+                <a:solidFill>
+                  <a:srgbClr val="7030A0"/>
+                </a:solidFill>
+                <a:latin typeface="Cambria Math" panose="02040503050406030204" pitchFamily="18" charset="0"/>
+                <a:ea typeface="Cambria Math" panose="02040503050406030204" pitchFamily="18" charset="0"/>
+              </a:rPr>
+              <a:t> r</a:t>
+            </a:r>
+            <a:r>
+              <a:rPr lang="en-US" altLang="zh-CN" dirty="0">
+                <a:latin typeface="Cambria Math" panose="02040503050406030204" pitchFamily="18" charset="0"/>
+                <a:ea typeface="Cambria Math" panose="02040503050406030204" pitchFamily="18" charset="0"/>
+              </a:rPr>
+              <a:t>, </a:t>
+            </a:r>
+            <a:r>
+              <a:rPr lang="en-US" altLang="zh-CN" dirty="0">
+                <a:solidFill>
+                  <a:srgbClr val="7030A0"/>
+                </a:solidFill>
+                <a:latin typeface="Cambria Math" panose="02040503050406030204" pitchFamily="18" charset="0"/>
+                <a:ea typeface="Cambria Math" panose="02040503050406030204" pitchFamily="18" charset="0"/>
+              </a:rPr>
+              <a:t>L</a:t>
+            </a:r>
+            <a:r>
+              <a:rPr lang="en-US" altLang="zh-CN" dirty="0"/>
+              <a:t>, where </a:t>
+            </a:r>
+            <a:r>
+              <a:rPr lang="en-US" altLang="zh-CN" dirty="0">
+                <a:solidFill>
+                  <a:srgbClr val="7030A0"/>
+                </a:solidFill>
+                <a:latin typeface="Cambria Math" panose="02040503050406030204" pitchFamily="18" charset="0"/>
+                <a:ea typeface="Cambria Math" panose="02040503050406030204" pitchFamily="18" charset="0"/>
+              </a:rPr>
+              <a:t>r</a:t>
+            </a:r>
+            <a:r>
+              <a:rPr lang="en-US" altLang="zh-CN" dirty="0">
+                <a:solidFill>
+                  <a:srgbClr val="7030A0"/>
+                </a:solidFill>
+              </a:rPr>
+              <a:t> </a:t>
+            </a:r>
+            <a:r>
+              <a:rPr lang="en-US" altLang="zh-CN" dirty="0"/>
+              <a:t>is a register, </a:t>
+            </a:r>
+            <a:r>
+              <a:rPr lang="en-US" altLang="zh-CN" dirty="0">
+                <a:solidFill>
+                  <a:srgbClr val="7030A0"/>
+                </a:solidFill>
+                <a:latin typeface="Cambria Math" panose="02040503050406030204" pitchFamily="18" charset="0"/>
+                <a:ea typeface="Cambria Math" panose="02040503050406030204" pitchFamily="18" charset="0"/>
+              </a:rPr>
+              <a:t>L</a:t>
+            </a:r>
+            <a:r>
+              <a:rPr lang="en-US" altLang="zh-CN" dirty="0">
+                <a:solidFill>
+                  <a:srgbClr val="7030A0"/>
+                </a:solidFill>
+              </a:rPr>
+              <a:t> </a:t>
+            </a:r>
+            <a:r>
+              <a:rPr lang="en-US" altLang="zh-CN" dirty="0"/>
+              <a:t>is a </a:t>
+            </a:r>
+            <a:r>
+              <a:rPr lang="en-US" altLang="zh-CN" dirty="0" smtClean="0"/>
+              <a:t>label, and </a:t>
+            </a:r>
+            <a:r>
+              <a:rPr lang="en-US" altLang="zh-CN" dirty="0" err="1">
+                <a:solidFill>
+                  <a:srgbClr val="7030A0"/>
+                </a:solidFill>
+                <a:latin typeface="Cambria Math" panose="02040503050406030204" pitchFamily="18" charset="0"/>
+                <a:ea typeface="Cambria Math" panose="02040503050406030204" pitchFamily="18" charset="0"/>
+              </a:rPr>
+              <a:t>cond</a:t>
+            </a:r>
+            <a:r>
+              <a:rPr lang="en-US" altLang="zh-CN" dirty="0">
+                <a:solidFill>
+                  <a:srgbClr val="7030A0"/>
+                </a:solidFill>
+              </a:rPr>
+              <a:t> </a:t>
+            </a:r>
+            <a:r>
+              <a:rPr lang="en-US" altLang="zh-CN" dirty="0"/>
+              <a:t>stands for any of the common tests on values in the register </a:t>
+            </a:r>
+            <a:r>
+              <a:rPr lang="en-US" altLang="zh-CN" dirty="0">
+                <a:latin typeface="Cambria Math" panose="02040503050406030204" pitchFamily="18" charset="0"/>
+                <a:ea typeface="Cambria Math" panose="02040503050406030204" pitchFamily="18" charset="0"/>
+              </a:rPr>
+              <a:t>r</a:t>
+            </a:r>
+            <a:r>
+              <a:rPr lang="en-US" altLang="zh-CN" dirty="0" smtClean="0"/>
+              <a:t>. For </a:t>
+            </a:r>
+            <a:r>
+              <a:rPr lang="en-US" altLang="zh-CN" dirty="0"/>
+              <a:t>example, </a:t>
+            </a:r>
+            <a:r>
+              <a:rPr lang="en-US" altLang="zh-CN" dirty="0" smtClean="0">
+                <a:solidFill>
+                  <a:srgbClr val="7030A0"/>
+                </a:solidFill>
+                <a:latin typeface="Cambria Math" panose="02040503050406030204" pitchFamily="18" charset="0"/>
+                <a:ea typeface="Cambria Math" panose="02040503050406030204" pitchFamily="18" charset="0"/>
+              </a:rPr>
+              <a:t>BLTZ</a:t>
+            </a:r>
+            <a:r>
+              <a:rPr lang="en-US" altLang="zh-CN" dirty="0" smtClean="0">
+                <a:latin typeface="Cambria Math" panose="02040503050406030204" pitchFamily="18" charset="0"/>
+                <a:ea typeface="Cambria Math" panose="02040503050406030204" pitchFamily="18" charset="0"/>
+              </a:rPr>
+              <a:t> </a:t>
+            </a:r>
+            <a:r>
+              <a:rPr lang="en-US" altLang="zh-CN" dirty="0">
+                <a:solidFill>
+                  <a:srgbClr val="7030A0"/>
+                </a:solidFill>
+                <a:latin typeface="Cambria Math" panose="02040503050406030204" pitchFamily="18" charset="0"/>
+                <a:ea typeface="Cambria Math" panose="02040503050406030204" pitchFamily="18" charset="0"/>
+              </a:rPr>
+              <a:t>r</a:t>
+            </a:r>
+            <a:r>
+              <a:rPr lang="en-US" altLang="zh-CN" dirty="0">
+                <a:latin typeface="Cambria Math" panose="02040503050406030204" pitchFamily="18" charset="0"/>
+                <a:ea typeface="Cambria Math" panose="02040503050406030204" pitchFamily="18" charset="0"/>
+              </a:rPr>
+              <a:t>, </a:t>
+            </a:r>
+            <a:r>
+              <a:rPr lang="en-US" altLang="zh-CN" dirty="0">
+                <a:solidFill>
+                  <a:srgbClr val="7030A0"/>
+                </a:solidFill>
+                <a:latin typeface="Cambria Math" panose="02040503050406030204" pitchFamily="18" charset="0"/>
+                <a:ea typeface="Cambria Math" panose="02040503050406030204" pitchFamily="18" charset="0"/>
+              </a:rPr>
+              <a:t>L</a:t>
+            </a:r>
+            <a:r>
+              <a:rPr lang="en-US" altLang="zh-CN" dirty="0">
+                <a:latin typeface="Cambria Math" panose="02040503050406030204" pitchFamily="18" charset="0"/>
+                <a:ea typeface="Cambria Math" panose="02040503050406030204" pitchFamily="18" charset="0"/>
+              </a:rPr>
+              <a:t> </a:t>
+            </a:r>
+            <a:r>
+              <a:rPr lang="en-US" altLang="zh-CN" dirty="0"/>
+              <a:t>causes a jump to label </a:t>
+            </a:r>
+            <a:r>
+              <a:rPr lang="en-US" altLang="zh-CN" dirty="0">
+                <a:solidFill>
+                  <a:srgbClr val="7030A0"/>
+                </a:solidFill>
+                <a:latin typeface="Cambria Math" panose="02040503050406030204" pitchFamily="18" charset="0"/>
+                <a:ea typeface="Cambria Math" panose="02040503050406030204" pitchFamily="18" charset="0"/>
+              </a:rPr>
+              <a:t>L</a:t>
+            </a:r>
+            <a:r>
+              <a:rPr lang="en-US" altLang="zh-CN" dirty="0">
+                <a:latin typeface="Cambria Math" panose="02040503050406030204" pitchFamily="18" charset="0"/>
+                <a:ea typeface="Cambria Math" panose="02040503050406030204" pitchFamily="18" charset="0"/>
+              </a:rPr>
+              <a:t> </a:t>
+            </a:r>
+            <a:r>
+              <a:rPr lang="en-US" altLang="zh-CN" dirty="0"/>
+              <a:t>if the value in register </a:t>
+            </a:r>
+            <a:r>
+              <a:rPr lang="en-US" altLang="zh-CN" dirty="0">
+                <a:solidFill>
+                  <a:srgbClr val="7030A0"/>
+                </a:solidFill>
+                <a:latin typeface="Cambria Math" panose="02040503050406030204" pitchFamily="18" charset="0"/>
+                <a:ea typeface="Cambria Math" panose="02040503050406030204" pitchFamily="18" charset="0"/>
+              </a:rPr>
+              <a:t>r</a:t>
+            </a:r>
+            <a:r>
+              <a:rPr lang="en-US" altLang="zh-CN" dirty="0">
+                <a:solidFill>
+                  <a:srgbClr val="7030A0"/>
+                </a:solidFill>
+              </a:rPr>
+              <a:t> </a:t>
+            </a:r>
+            <a:r>
+              <a:rPr lang="en-US" altLang="zh-CN" dirty="0" smtClean="0"/>
+              <a:t>is less </a:t>
+            </a:r>
+            <a:r>
+              <a:rPr lang="en-US" altLang="zh-CN" dirty="0"/>
+              <a:t>than zero, and allows control to pass to the next machine </a:t>
+            </a:r>
+            <a:r>
+              <a:rPr lang="en-US" altLang="zh-CN" dirty="0" smtClean="0"/>
+              <a:t>instruction if </a:t>
+            </a:r>
+            <a:r>
+              <a:rPr lang="en-US" altLang="zh-CN" dirty="0"/>
+              <a:t>not.</a:t>
+            </a:r>
+            <a:endParaRPr lang="zh-CN" altLang="en-US" dirty="0"/>
+          </a:p>
+        </p:txBody>
+      </p:sp>
+    </p:spTree>
+    <p:extLst>
+      <p:ext uri="{BB962C8B-B14F-4D97-AF65-F5344CB8AC3E}">
+        <p14:creationId xmlns:p14="http://schemas.microsoft.com/office/powerpoint/2010/main" val="277908193"/>
+      </p:ext>
+    </p:extLst>
+  </p:cSld>
+  <p:clrMapOvr>
+    <a:masterClrMapping/>
+  </p:clrMapOvr>
+  <mc:AlternateContent xmlns:mc="http://schemas.openxmlformats.org/markup-compatibility/2006" xmlns:p14="http://schemas.microsoft.com/office/powerpoint/2010/main">
+    <mc:Choice Requires="p14">
+      <p:transition spd="med" p14:dur="700">
+        <p:fade/>
+      </p:transition>
+    </mc:Choice>
+    <mc:Fallback xmlns="">
+      <p:transition spd="med">
+        <p:fade/>
+      </p:transition>
+    </mc:Fallback>
+  </mc:AlternateContent>
+</p:sld>
+</file>
+
+<file path=ppt/slides/slide9.xml><?xml version="1.0" encoding="utf-8"?>
+<p:sld xmlns:a="http://schemas.openxmlformats.org/drawingml/2006/main" xmlns:r="http://schemas.openxmlformats.org/officeDocument/2006/relationships" xmlns:p="http://schemas.openxmlformats.org/presentationml/2006/main">
+  <p:cSld>
+    <p:spTree>
+      <p:nvGrpSpPr>
+        <p:cNvPr id="1" name=""/>
+        <p:cNvGrpSpPr/>
+        <p:nvPr/>
+      </p:nvGrpSpPr>
+      <p:grpSpPr>
+        <a:xfrm>
+          <a:off x="0" y="0"/>
+          <a:ext cx="0" cy="0"/>
+          <a:chOff x="0" y="0"/>
+          <a:chExt cx="0" cy="0"/>
+        </a:xfrm>
+      </p:grpSpPr>
+      <p:sp>
+        <p:nvSpPr>
+          <p:cNvPr id="2" name="标题 1"/>
+          <p:cNvSpPr>
+            <a:spLocks noGrp="1"/>
+          </p:cNvSpPr>
+          <p:nvPr>
+            <p:ph type="title"/>
+          </p:nvPr>
+        </p:nvSpPr>
+        <p:spPr/>
+        <p:txBody>
+          <a:bodyPr/>
+          <a:lstStyle/>
+          <a:p>
+            <a:r>
+              <a:rPr lang="en-US" altLang="zh-CN" dirty="0" smtClean="0"/>
+              <a:t>8.2 The </a:t>
+            </a:r>
+            <a:r>
+              <a:rPr lang="en-US" altLang="zh-CN" dirty="0"/>
+              <a:t>Target </a:t>
+            </a:r>
+            <a:r>
+              <a:rPr lang="en-US" altLang="zh-CN" dirty="0" smtClean="0"/>
+              <a:t>Language-addressing modes</a:t>
+            </a:r>
+            <a:endParaRPr lang="zh-CN" altLang="en-US" dirty="0"/>
+          </a:p>
+        </p:txBody>
+      </p:sp>
+      <p:sp>
+        <p:nvSpPr>
+          <p:cNvPr id="3" name="内容占位符 2"/>
+          <p:cNvSpPr>
+            <a:spLocks noGrp="1"/>
+          </p:cNvSpPr>
+          <p:nvPr>
+            <p:ph idx="1"/>
+          </p:nvPr>
+        </p:nvSpPr>
+        <p:spPr>
+          <a:xfrm>
+            <a:off x="820129" y="1600200"/>
+            <a:ext cx="7486650" cy="5257800"/>
+          </a:xfrm>
+        </p:spPr>
+        <p:txBody>
+          <a:bodyPr>
+            <a:normAutofit/>
+          </a:bodyPr>
+          <a:lstStyle/>
+          <a:p>
+            <a:r>
+              <a:rPr lang="en-US" altLang="zh-CN" dirty="0" smtClean="0"/>
+              <a:t>Assume </a:t>
+            </a:r>
+            <a:r>
+              <a:rPr lang="en-US" altLang="zh-CN" dirty="0"/>
+              <a:t>our target machine has a variety of addressing modes</a:t>
+            </a:r>
+            <a:r>
+              <a:rPr lang="en-US" altLang="zh-CN" dirty="0" smtClean="0"/>
+              <a:t>:</a:t>
+            </a:r>
+            <a:endParaRPr lang="en-US" altLang="zh-CN" dirty="0"/>
+          </a:p>
+          <a:p>
+            <a:pPr>
+              <a:buFont typeface="Wingdings" panose="05000000000000000000" pitchFamily="2" charset="2"/>
+              <a:buChar char="ü"/>
+            </a:pPr>
+            <a:r>
+              <a:rPr lang="en-US" altLang="zh-CN" dirty="0"/>
+              <a:t>In instructions, a location can be a variable name x referring to the </a:t>
+            </a:r>
+            <a:r>
+              <a:rPr lang="en-US" altLang="zh-CN" dirty="0" smtClean="0"/>
+              <a:t>memory location </a:t>
+            </a:r>
+            <a:r>
+              <a:rPr lang="en-US" altLang="zh-CN" dirty="0"/>
+              <a:t>that is reserved for x (that is, the I-value of x</a:t>
+            </a:r>
+            <a:r>
+              <a:rPr lang="en-US" altLang="zh-CN" dirty="0" smtClean="0"/>
+              <a:t>)</a:t>
+            </a:r>
+          </a:p>
+          <a:p>
+            <a:pPr>
+              <a:buFont typeface="Wingdings" panose="05000000000000000000" pitchFamily="2" charset="2"/>
+              <a:buChar char="ü"/>
+            </a:pPr>
+            <a:r>
+              <a:rPr lang="en-US" altLang="zh-CN" dirty="0"/>
+              <a:t>A location can also be an indexed address of the form </a:t>
+            </a:r>
+            <a:r>
+              <a:rPr lang="en-US" altLang="zh-CN" dirty="0" smtClean="0">
+                <a:solidFill>
+                  <a:srgbClr val="7030A0"/>
+                </a:solidFill>
+                <a:latin typeface="Cambria Math" panose="02040503050406030204" pitchFamily="18" charset="0"/>
+                <a:ea typeface="Cambria Math" panose="02040503050406030204" pitchFamily="18" charset="0"/>
+              </a:rPr>
+              <a:t>a(r</a:t>
+            </a:r>
+            <a:r>
+              <a:rPr lang="en-US" altLang="zh-CN" dirty="0">
+                <a:solidFill>
+                  <a:srgbClr val="7030A0"/>
+                </a:solidFill>
+                <a:latin typeface="Cambria Math" panose="02040503050406030204" pitchFamily="18" charset="0"/>
+                <a:ea typeface="Cambria Math" panose="02040503050406030204" pitchFamily="18" charset="0"/>
+              </a:rPr>
+              <a:t>), </a:t>
+            </a:r>
+            <a:r>
+              <a:rPr lang="en-US" altLang="zh-CN" dirty="0"/>
+              <a:t>where a </a:t>
+            </a:r>
+            <a:r>
+              <a:rPr lang="en-US" altLang="zh-CN" dirty="0" smtClean="0"/>
+              <a:t>is a </a:t>
+            </a:r>
+            <a:r>
+              <a:rPr lang="en-US" altLang="zh-CN" dirty="0"/>
+              <a:t>variable and </a:t>
+            </a:r>
+            <a:r>
+              <a:rPr lang="en-US" altLang="zh-CN" dirty="0">
+                <a:solidFill>
+                  <a:srgbClr val="7030A0"/>
+                </a:solidFill>
+                <a:latin typeface="Cambria Math" panose="02040503050406030204" pitchFamily="18" charset="0"/>
+                <a:ea typeface="Cambria Math" panose="02040503050406030204" pitchFamily="18" charset="0"/>
+              </a:rPr>
+              <a:t>r</a:t>
+            </a:r>
+            <a:r>
+              <a:rPr lang="en-US" altLang="zh-CN" dirty="0"/>
+              <a:t> is a register</a:t>
+            </a:r>
+            <a:r>
+              <a:rPr lang="en-US" altLang="zh-CN" dirty="0" smtClean="0"/>
+              <a:t>.</a:t>
+            </a:r>
+          </a:p>
+          <a:p>
+            <a:pPr>
+              <a:buFont typeface="Wingdings" panose="05000000000000000000" pitchFamily="2" charset="2"/>
+              <a:buChar char="ü"/>
+            </a:pPr>
+            <a:r>
+              <a:rPr lang="en-US" altLang="zh-CN" dirty="0">
+                <a:solidFill>
+                  <a:srgbClr val="7030A0"/>
+                </a:solidFill>
+                <a:latin typeface="Cambria Math" panose="02040503050406030204" pitchFamily="18" charset="0"/>
+                <a:ea typeface="Cambria Math" panose="02040503050406030204" pitchFamily="18" charset="0"/>
+              </a:rPr>
+              <a:t>LD </a:t>
+            </a:r>
+            <a:r>
+              <a:rPr lang="en-US" altLang="zh-CN" dirty="0" smtClean="0">
+                <a:solidFill>
+                  <a:srgbClr val="7030A0"/>
+                </a:solidFill>
+                <a:latin typeface="Cambria Math" panose="02040503050406030204" pitchFamily="18" charset="0"/>
+                <a:ea typeface="Cambria Math" panose="02040503050406030204" pitchFamily="18" charset="0"/>
+              </a:rPr>
+              <a:t>R</a:t>
+            </a:r>
+            <a:r>
+              <a:rPr lang="en-US" altLang="zh-CN" baseline="-25000" dirty="0" smtClean="0">
+                <a:solidFill>
+                  <a:srgbClr val="7030A0"/>
+                </a:solidFill>
+                <a:latin typeface="Cambria Math" panose="02040503050406030204" pitchFamily="18" charset="0"/>
+                <a:ea typeface="Cambria Math" panose="02040503050406030204" pitchFamily="18" charset="0"/>
+              </a:rPr>
+              <a:t>1</a:t>
+            </a:r>
+            <a:r>
+              <a:rPr lang="en-US" altLang="zh-CN" dirty="0" smtClean="0">
+                <a:solidFill>
+                  <a:srgbClr val="7030A0"/>
+                </a:solidFill>
+                <a:latin typeface="Cambria Math" panose="02040503050406030204" pitchFamily="18" charset="0"/>
+                <a:ea typeface="Cambria Math" panose="02040503050406030204" pitchFamily="18" charset="0"/>
+              </a:rPr>
+              <a:t>, a(R</a:t>
+            </a:r>
+            <a:r>
+              <a:rPr lang="en-US" altLang="zh-CN" baseline="-25000" dirty="0" smtClean="0">
+                <a:solidFill>
+                  <a:srgbClr val="7030A0"/>
+                </a:solidFill>
+                <a:latin typeface="Cambria Math" panose="02040503050406030204" pitchFamily="18" charset="0"/>
+                <a:ea typeface="Cambria Math" panose="02040503050406030204" pitchFamily="18" charset="0"/>
+              </a:rPr>
+              <a:t>2</a:t>
+            </a:r>
+            <a:r>
+              <a:rPr lang="en-US" altLang="zh-CN" dirty="0" smtClean="0">
+                <a:solidFill>
+                  <a:srgbClr val="7030A0"/>
+                </a:solidFill>
+                <a:latin typeface="Cambria Math" panose="02040503050406030204" pitchFamily="18" charset="0"/>
+                <a:ea typeface="Cambria Math" panose="02040503050406030204" pitchFamily="18" charset="0"/>
+              </a:rPr>
+              <a:t>) </a:t>
+            </a:r>
+            <a:r>
+              <a:rPr lang="en-US" altLang="zh-CN" dirty="0"/>
+              <a:t>has the effect of </a:t>
+            </a:r>
+            <a:r>
+              <a:rPr lang="en-US" altLang="zh-CN" dirty="0" smtClean="0"/>
+              <a:t>setting </a:t>
+            </a:r>
+            <a:r>
+              <a:rPr lang="en-US" altLang="zh-CN" dirty="0">
+                <a:solidFill>
+                  <a:srgbClr val="7030A0"/>
+                </a:solidFill>
+                <a:latin typeface="Cambria Math" panose="02040503050406030204" pitchFamily="18" charset="0"/>
+                <a:ea typeface="Cambria Math" panose="02040503050406030204" pitchFamily="18" charset="0"/>
+              </a:rPr>
+              <a:t>R</a:t>
+            </a:r>
+            <a:r>
+              <a:rPr lang="en-US" altLang="zh-CN" baseline="-25000" dirty="0">
+                <a:solidFill>
+                  <a:srgbClr val="7030A0"/>
+                </a:solidFill>
+                <a:latin typeface="Cambria Math" panose="02040503050406030204" pitchFamily="18" charset="0"/>
+                <a:ea typeface="Cambria Math" panose="02040503050406030204" pitchFamily="18" charset="0"/>
+              </a:rPr>
+              <a:t>1</a:t>
+            </a:r>
+            <a:r>
+              <a:rPr lang="en-US" altLang="zh-CN" dirty="0" smtClean="0"/>
+              <a:t> </a:t>
+            </a:r>
+            <a:r>
+              <a:rPr lang="en-US" altLang="zh-CN" dirty="0"/>
+              <a:t>= contents </a:t>
+            </a:r>
+            <a:r>
+              <a:rPr lang="en-US" altLang="zh-CN" dirty="0" smtClean="0"/>
+              <a:t>(</a:t>
+            </a:r>
+            <a:r>
+              <a:rPr lang="en-US" altLang="zh-CN" dirty="0" err="1" smtClean="0"/>
+              <a:t>a+contents</a:t>
+            </a:r>
+            <a:r>
+              <a:rPr lang="en-US" altLang="zh-CN" dirty="0" smtClean="0"/>
+              <a:t> (</a:t>
+            </a:r>
+            <a:r>
+              <a:rPr lang="en-US" altLang="zh-CN" dirty="0">
+                <a:solidFill>
+                  <a:srgbClr val="7030A0"/>
+                </a:solidFill>
+                <a:latin typeface="Cambria Math" panose="02040503050406030204" pitchFamily="18" charset="0"/>
+                <a:ea typeface="Cambria Math" panose="02040503050406030204" pitchFamily="18" charset="0"/>
+              </a:rPr>
+              <a:t>R</a:t>
+            </a:r>
+            <a:r>
+              <a:rPr lang="en-US" altLang="zh-CN" baseline="-25000" dirty="0">
+                <a:solidFill>
+                  <a:srgbClr val="7030A0"/>
+                </a:solidFill>
+                <a:latin typeface="Cambria Math" panose="02040503050406030204" pitchFamily="18" charset="0"/>
+                <a:ea typeface="Cambria Math" panose="02040503050406030204" pitchFamily="18" charset="0"/>
+              </a:rPr>
+              <a:t>2</a:t>
+            </a:r>
+            <a:r>
+              <a:rPr lang="en-US" altLang="zh-CN" dirty="0" smtClean="0"/>
+              <a:t>)), where contents(x</a:t>
+            </a:r>
+            <a:r>
+              <a:rPr lang="en-US" altLang="zh-CN" dirty="0"/>
+              <a:t>) denotes the </a:t>
+            </a:r>
+            <a:r>
+              <a:rPr lang="en-US" altLang="zh-CN" dirty="0" smtClean="0"/>
+              <a:t>contents of </a:t>
+            </a:r>
+            <a:r>
+              <a:rPr lang="en-US" altLang="zh-CN" dirty="0"/>
+              <a:t>the register or memory location represented by x</a:t>
+            </a:r>
+            <a:r>
+              <a:rPr lang="en-US" altLang="zh-CN" dirty="0" smtClean="0"/>
+              <a:t>.</a:t>
+            </a:r>
+          </a:p>
+          <a:p>
+            <a:pPr>
+              <a:buFont typeface="Wingdings" panose="05000000000000000000" pitchFamily="2" charset="2"/>
+              <a:buChar char="ü"/>
+            </a:pPr>
+            <a:r>
+              <a:rPr lang="en-US" altLang="zh-CN" dirty="0"/>
+              <a:t>A memory location can be an integer indexed by a register. For </a:t>
+            </a:r>
+            <a:r>
+              <a:rPr lang="en-US" altLang="zh-CN" dirty="0" smtClean="0"/>
+              <a:t>example</a:t>
+            </a:r>
+            <a:r>
+              <a:rPr lang="en-US" altLang="zh-CN" dirty="0" smtClean="0">
+                <a:solidFill>
+                  <a:srgbClr val="7030A0"/>
+                </a:solidFill>
+                <a:latin typeface="Cambria Math" panose="02040503050406030204" pitchFamily="18" charset="0"/>
+                <a:ea typeface="Cambria Math" panose="02040503050406030204" pitchFamily="18" charset="0"/>
+              </a:rPr>
+              <a:t>, LD R</a:t>
+            </a:r>
+            <a:r>
+              <a:rPr lang="en-US" altLang="zh-CN" baseline="-25000" dirty="0" smtClean="0">
+                <a:solidFill>
+                  <a:srgbClr val="7030A0"/>
+                </a:solidFill>
+                <a:latin typeface="Cambria Math" panose="02040503050406030204" pitchFamily="18" charset="0"/>
+                <a:ea typeface="Cambria Math" panose="02040503050406030204" pitchFamily="18" charset="0"/>
+              </a:rPr>
+              <a:t>1</a:t>
+            </a:r>
+            <a:r>
+              <a:rPr lang="en-US" altLang="zh-CN" dirty="0" smtClean="0">
+                <a:solidFill>
+                  <a:srgbClr val="7030A0"/>
+                </a:solidFill>
+                <a:latin typeface="Cambria Math" panose="02040503050406030204" pitchFamily="18" charset="0"/>
+                <a:ea typeface="Cambria Math" panose="02040503050406030204" pitchFamily="18" charset="0"/>
+              </a:rPr>
+              <a:t>, 100 </a:t>
+            </a:r>
+            <a:r>
+              <a:rPr lang="en-US" altLang="zh-CN" dirty="0">
+                <a:solidFill>
+                  <a:srgbClr val="7030A0"/>
+                </a:solidFill>
+                <a:latin typeface="Cambria Math" panose="02040503050406030204" pitchFamily="18" charset="0"/>
+                <a:ea typeface="Cambria Math" panose="02040503050406030204" pitchFamily="18" charset="0"/>
+              </a:rPr>
+              <a:t>(</a:t>
+            </a:r>
+            <a:r>
+              <a:rPr lang="en-US" altLang="zh-CN" dirty="0" smtClean="0">
+                <a:solidFill>
+                  <a:srgbClr val="7030A0"/>
+                </a:solidFill>
+                <a:latin typeface="Cambria Math" panose="02040503050406030204" pitchFamily="18" charset="0"/>
+                <a:ea typeface="Cambria Math" panose="02040503050406030204" pitchFamily="18" charset="0"/>
+              </a:rPr>
+              <a:t>R</a:t>
+            </a:r>
+            <a:r>
+              <a:rPr lang="en-US" altLang="zh-CN" baseline="-25000" dirty="0" smtClean="0">
+                <a:solidFill>
+                  <a:srgbClr val="7030A0"/>
+                </a:solidFill>
+                <a:latin typeface="Cambria Math" panose="02040503050406030204" pitchFamily="18" charset="0"/>
+                <a:ea typeface="Cambria Math" panose="02040503050406030204" pitchFamily="18" charset="0"/>
+              </a:rPr>
+              <a:t>2</a:t>
+            </a:r>
+            <a:r>
+              <a:rPr lang="en-US" altLang="zh-CN" dirty="0" smtClean="0">
+                <a:solidFill>
+                  <a:srgbClr val="7030A0"/>
+                </a:solidFill>
+                <a:latin typeface="Cambria Math" panose="02040503050406030204" pitchFamily="18" charset="0"/>
+                <a:ea typeface="Cambria Math" panose="02040503050406030204" pitchFamily="18" charset="0"/>
+              </a:rPr>
+              <a:t>) </a:t>
+            </a:r>
+            <a:r>
+              <a:rPr lang="en-US" altLang="zh-CN" dirty="0"/>
+              <a:t>has the effect of setting </a:t>
+            </a:r>
+            <a:r>
+              <a:rPr lang="en-US" altLang="zh-CN" dirty="0" smtClean="0"/>
+              <a:t>R</a:t>
+            </a:r>
+            <a:r>
+              <a:rPr lang="en-US" altLang="zh-CN" baseline="-25000" dirty="0" smtClean="0"/>
+              <a:t>1</a:t>
+            </a:r>
+            <a:r>
+              <a:rPr lang="en-US" altLang="zh-CN" dirty="0" smtClean="0"/>
+              <a:t>= </a:t>
+            </a:r>
+            <a:r>
+              <a:rPr lang="en-US" altLang="zh-CN" dirty="0"/>
+              <a:t>contents (</a:t>
+            </a:r>
+            <a:r>
+              <a:rPr lang="en-US" altLang="zh-CN" dirty="0" smtClean="0"/>
+              <a:t>100+contents </a:t>
+            </a:r>
+            <a:r>
+              <a:rPr lang="en-US" altLang="zh-CN" dirty="0"/>
+              <a:t>(R</a:t>
+            </a:r>
+            <a:r>
+              <a:rPr lang="en-US" altLang="zh-CN" baseline="-25000" dirty="0"/>
+              <a:t>2</a:t>
+            </a:r>
+            <a:r>
+              <a:rPr lang="en-US" altLang="zh-CN" dirty="0" smtClean="0"/>
+              <a:t>)).</a:t>
+            </a:r>
+          </a:p>
+          <a:p>
+            <a:pPr>
+              <a:buFont typeface="Wingdings" panose="05000000000000000000" pitchFamily="2" charset="2"/>
+              <a:buChar char="ü"/>
+            </a:pPr>
+            <a:r>
+              <a:rPr lang="en-US" altLang="zh-CN" dirty="0"/>
+              <a:t>We also allow two indirect addressing modes: </a:t>
+            </a:r>
+            <a:r>
+              <a:rPr lang="en-US" altLang="zh-CN" dirty="0">
+                <a:solidFill>
+                  <a:srgbClr val="7030A0"/>
+                </a:solidFill>
+                <a:latin typeface="Cambria Math" panose="02040503050406030204" pitchFamily="18" charset="0"/>
+                <a:ea typeface="Cambria Math" panose="02040503050406030204" pitchFamily="18" charset="0"/>
+              </a:rPr>
+              <a:t>*r </a:t>
+            </a:r>
+            <a:r>
+              <a:rPr lang="en-US" altLang="zh-CN" dirty="0"/>
+              <a:t>means the memory </a:t>
+            </a:r>
+            <a:r>
+              <a:rPr lang="en-US" altLang="zh-CN" dirty="0" smtClean="0"/>
+              <a:t>location found </a:t>
+            </a:r>
+            <a:r>
+              <a:rPr lang="en-US" altLang="zh-CN" dirty="0"/>
+              <a:t>in the location </a:t>
+            </a:r>
+            <a:r>
+              <a:rPr lang="en-US" altLang="zh-CN" dirty="0" smtClean="0"/>
+              <a:t>represented </a:t>
+            </a:r>
+            <a:r>
+              <a:rPr lang="en-US" altLang="zh-CN" dirty="0"/>
+              <a:t>by the contents of register </a:t>
+            </a:r>
+            <a:r>
+              <a:rPr lang="en-US" altLang="zh-CN" dirty="0">
+                <a:solidFill>
+                  <a:srgbClr val="7030A0"/>
+                </a:solidFill>
+                <a:latin typeface="Cambria Math" panose="02040503050406030204" pitchFamily="18" charset="0"/>
+                <a:ea typeface="Cambria Math" panose="02040503050406030204" pitchFamily="18" charset="0"/>
+              </a:rPr>
+              <a:t>r</a:t>
+            </a:r>
+            <a:r>
+              <a:rPr lang="en-US" altLang="zh-CN" dirty="0"/>
+              <a:t> </a:t>
+            </a:r>
+            <a:r>
+              <a:rPr lang="en-US" altLang="zh-CN" dirty="0" smtClean="0"/>
+              <a:t>and </a:t>
+            </a:r>
+            <a:r>
+              <a:rPr lang="en-US" altLang="zh-CN" dirty="0" smtClean="0">
+                <a:solidFill>
+                  <a:srgbClr val="7030A0"/>
+                </a:solidFill>
+                <a:latin typeface="Cambria Math" panose="02040503050406030204" pitchFamily="18" charset="0"/>
+                <a:ea typeface="Cambria Math" panose="02040503050406030204" pitchFamily="18" charset="0"/>
+              </a:rPr>
+              <a:t>*100(r</a:t>
+            </a:r>
+            <a:r>
+              <a:rPr lang="en-US" altLang="zh-CN" dirty="0">
+                <a:solidFill>
+                  <a:srgbClr val="7030A0"/>
+                </a:solidFill>
+                <a:latin typeface="Cambria Math" panose="02040503050406030204" pitchFamily="18" charset="0"/>
+                <a:ea typeface="Cambria Math" panose="02040503050406030204" pitchFamily="18" charset="0"/>
+              </a:rPr>
+              <a:t>) </a:t>
+            </a:r>
+            <a:r>
+              <a:rPr lang="en-US" altLang="zh-CN" dirty="0"/>
+              <a:t>means the memory location found in the location obtained </a:t>
+            </a:r>
+            <a:r>
+              <a:rPr lang="en-US" altLang="zh-CN" dirty="0" smtClean="0"/>
+              <a:t>by adding </a:t>
+            </a:r>
+            <a:r>
+              <a:rPr lang="en-US" altLang="zh-CN" dirty="0"/>
+              <a:t>100 to the contents of </a:t>
+            </a:r>
+            <a:r>
+              <a:rPr lang="en-US" altLang="zh-CN" dirty="0">
+                <a:solidFill>
+                  <a:srgbClr val="7030A0"/>
+                </a:solidFill>
+                <a:latin typeface="Cambria Math" panose="02040503050406030204" pitchFamily="18" charset="0"/>
+                <a:ea typeface="Cambria Math" panose="02040503050406030204" pitchFamily="18" charset="0"/>
+              </a:rPr>
+              <a:t>r</a:t>
+            </a:r>
+            <a:r>
+              <a:rPr lang="en-US" altLang="zh-CN" dirty="0"/>
+              <a:t>. For example, </a:t>
+            </a:r>
+            <a:r>
+              <a:rPr lang="en-US" altLang="zh-CN" dirty="0">
+                <a:latin typeface="Cambria Math" panose="02040503050406030204" pitchFamily="18" charset="0"/>
+                <a:ea typeface="Cambria Math" panose="02040503050406030204" pitchFamily="18" charset="0"/>
+              </a:rPr>
+              <a:t>LD </a:t>
+            </a:r>
+            <a:r>
+              <a:rPr lang="en-US" altLang="zh-CN" dirty="0" smtClean="0">
+                <a:latin typeface="Cambria Math" panose="02040503050406030204" pitchFamily="18" charset="0"/>
+                <a:ea typeface="Cambria Math" panose="02040503050406030204" pitchFamily="18" charset="0"/>
+              </a:rPr>
+              <a:t>R</a:t>
+            </a:r>
+            <a:r>
+              <a:rPr lang="en-US" altLang="zh-CN" baseline="-25000" dirty="0" smtClean="0">
+                <a:latin typeface="Cambria Math" panose="02040503050406030204" pitchFamily="18" charset="0"/>
+                <a:ea typeface="Cambria Math" panose="02040503050406030204" pitchFamily="18" charset="0"/>
+              </a:rPr>
+              <a:t>1</a:t>
+            </a:r>
+            <a:r>
+              <a:rPr lang="en-US" altLang="zh-CN" dirty="0" smtClean="0">
+                <a:latin typeface="Cambria Math" panose="02040503050406030204" pitchFamily="18" charset="0"/>
+                <a:ea typeface="Cambria Math" panose="02040503050406030204" pitchFamily="18" charset="0"/>
+              </a:rPr>
+              <a:t>, *100(R</a:t>
+            </a:r>
+            <a:r>
+              <a:rPr lang="en-US" altLang="zh-CN" baseline="-25000" dirty="0" smtClean="0">
+                <a:latin typeface="Cambria Math" panose="02040503050406030204" pitchFamily="18" charset="0"/>
+                <a:ea typeface="Cambria Math" panose="02040503050406030204" pitchFamily="18" charset="0"/>
+              </a:rPr>
+              <a:t>2</a:t>
+            </a:r>
+            <a:r>
+              <a:rPr lang="en-US" altLang="zh-CN" dirty="0">
+                <a:latin typeface="Cambria Math" panose="02040503050406030204" pitchFamily="18" charset="0"/>
+                <a:ea typeface="Cambria Math" panose="02040503050406030204" pitchFamily="18" charset="0"/>
+              </a:rPr>
+              <a:t>) </a:t>
+            </a:r>
+            <a:r>
+              <a:rPr lang="en-US" altLang="zh-CN" dirty="0"/>
+              <a:t>has </a:t>
+            </a:r>
+            <a:r>
+              <a:rPr lang="en-US" altLang="zh-CN" dirty="0" smtClean="0"/>
+              <a:t>the effect </a:t>
+            </a:r>
+            <a:r>
+              <a:rPr lang="en-US" altLang="zh-CN" dirty="0"/>
+              <a:t>of setting </a:t>
+            </a:r>
+            <a:r>
+              <a:rPr lang="en-US" altLang="zh-CN" dirty="0" err="1" smtClean="0"/>
+              <a:t>R</a:t>
+            </a:r>
+            <a:r>
+              <a:rPr lang="en-US" altLang="zh-CN" baseline="-25000" dirty="0" err="1" smtClean="0"/>
+              <a:t>l</a:t>
+            </a:r>
+            <a:r>
+              <a:rPr lang="en-US" altLang="zh-CN" dirty="0" smtClean="0"/>
+              <a:t>=contents(contents </a:t>
+            </a:r>
+            <a:r>
+              <a:rPr lang="en-US" altLang="zh-CN" dirty="0"/>
+              <a:t>(</a:t>
+            </a:r>
+            <a:r>
+              <a:rPr lang="en-US" altLang="zh-CN" dirty="0" smtClean="0"/>
+              <a:t>100+contents </a:t>
+            </a:r>
+            <a:r>
+              <a:rPr lang="en-US" altLang="zh-CN" dirty="0"/>
+              <a:t>(R</a:t>
+            </a:r>
+            <a:r>
+              <a:rPr lang="en-US" altLang="zh-CN" baseline="-25000" dirty="0"/>
+              <a:t>2</a:t>
+            </a:r>
+            <a:r>
+              <a:rPr lang="en-US" altLang="zh-CN" dirty="0"/>
+              <a:t>) ) </a:t>
+            </a:r>
+            <a:r>
+              <a:rPr lang="en-US" altLang="zh-CN" dirty="0" smtClean="0"/>
+              <a:t>)</a:t>
+            </a:r>
+          </a:p>
+          <a:p>
+            <a:pPr>
+              <a:buFont typeface="Wingdings" panose="05000000000000000000" pitchFamily="2" charset="2"/>
+              <a:buChar char="ü"/>
+            </a:pPr>
+            <a:r>
+              <a:rPr lang="en-US" altLang="zh-CN" dirty="0"/>
+              <a:t>Finally, we allow an immediate constant addressing mode. The </a:t>
+            </a:r>
+            <a:r>
+              <a:rPr lang="en-US" altLang="zh-CN" dirty="0" smtClean="0"/>
+              <a:t>constant is </a:t>
+            </a:r>
+            <a:r>
+              <a:rPr lang="en-US" altLang="zh-CN" dirty="0"/>
+              <a:t>prefixed by #. The instruction </a:t>
+            </a:r>
+            <a:r>
+              <a:rPr lang="en-US" altLang="zh-CN" dirty="0">
+                <a:solidFill>
+                  <a:srgbClr val="7030A0"/>
+                </a:solidFill>
+                <a:latin typeface="Cambria Math" panose="02040503050406030204" pitchFamily="18" charset="0"/>
+                <a:ea typeface="Cambria Math" panose="02040503050406030204" pitchFamily="18" charset="0"/>
+              </a:rPr>
+              <a:t>LD </a:t>
+            </a:r>
+            <a:r>
+              <a:rPr lang="en-US" altLang="zh-CN" dirty="0" smtClean="0">
+                <a:solidFill>
+                  <a:srgbClr val="7030A0"/>
+                </a:solidFill>
+                <a:latin typeface="Cambria Math" panose="02040503050406030204" pitchFamily="18" charset="0"/>
+                <a:ea typeface="Cambria Math" panose="02040503050406030204" pitchFamily="18" charset="0"/>
+              </a:rPr>
+              <a:t>R</a:t>
+            </a:r>
+            <a:r>
+              <a:rPr lang="en-US" altLang="zh-CN" baseline="-25000" dirty="0" smtClean="0">
+                <a:solidFill>
+                  <a:srgbClr val="7030A0"/>
+                </a:solidFill>
+                <a:latin typeface="Cambria Math" panose="02040503050406030204" pitchFamily="18" charset="0"/>
+                <a:ea typeface="Cambria Math" panose="02040503050406030204" pitchFamily="18" charset="0"/>
+              </a:rPr>
+              <a:t>1</a:t>
+            </a:r>
+            <a:r>
+              <a:rPr lang="en-US" altLang="zh-CN" dirty="0" smtClean="0">
+                <a:solidFill>
+                  <a:srgbClr val="7030A0"/>
+                </a:solidFill>
+                <a:latin typeface="Cambria Math" panose="02040503050406030204" pitchFamily="18" charset="0"/>
+                <a:ea typeface="Cambria Math" panose="02040503050406030204" pitchFamily="18" charset="0"/>
+              </a:rPr>
+              <a:t>, #100 </a:t>
+            </a:r>
+            <a:r>
+              <a:rPr lang="en-US" altLang="zh-CN" dirty="0"/>
+              <a:t>loads the integer 100 </a:t>
+            </a:r>
+            <a:r>
+              <a:rPr lang="en-US" altLang="zh-CN" dirty="0" smtClean="0"/>
+              <a:t>into register R</a:t>
+            </a:r>
+            <a:r>
+              <a:rPr lang="en-US" altLang="zh-CN" baseline="-25000" dirty="0" smtClean="0"/>
+              <a:t>1</a:t>
+            </a:r>
+            <a:r>
+              <a:rPr lang="en-US" altLang="zh-CN" dirty="0" smtClean="0"/>
+              <a:t>, </a:t>
+            </a:r>
+            <a:r>
+              <a:rPr lang="en-US" altLang="zh-CN" dirty="0"/>
+              <a:t>and </a:t>
+            </a:r>
+            <a:r>
+              <a:rPr lang="en-US" altLang="zh-CN" dirty="0">
+                <a:solidFill>
+                  <a:srgbClr val="7030A0"/>
+                </a:solidFill>
+                <a:latin typeface="Cambria Math" panose="02040503050406030204" pitchFamily="18" charset="0"/>
+                <a:ea typeface="Cambria Math" panose="02040503050406030204" pitchFamily="18" charset="0"/>
+              </a:rPr>
+              <a:t>ADD R</a:t>
+            </a:r>
+            <a:r>
+              <a:rPr lang="en-US" altLang="zh-CN" baseline="-25000" dirty="0">
+                <a:solidFill>
+                  <a:srgbClr val="7030A0"/>
+                </a:solidFill>
+                <a:latin typeface="Cambria Math" panose="02040503050406030204" pitchFamily="18" charset="0"/>
+                <a:ea typeface="Cambria Math" panose="02040503050406030204" pitchFamily="18" charset="0"/>
+              </a:rPr>
+              <a:t>1</a:t>
+            </a:r>
+            <a:r>
+              <a:rPr lang="en-US" altLang="zh-CN" dirty="0" smtClean="0">
+                <a:solidFill>
+                  <a:srgbClr val="7030A0"/>
+                </a:solidFill>
+                <a:latin typeface="Cambria Math" panose="02040503050406030204" pitchFamily="18" charset="0"/>
+                <a:ea typeface="Cambria Math" panose="02040503050406030204" pitchFamily="18" charset="0"/>
+              </a:rPr>
+              <a:t>, </a:t>
+            </a:r>
+            <a:r>
+              <a:rPr lang="en-US" altLang="zh-CN" dirty="0">
+                <a:solidFill>
+                  <a:srgbClr val="7030A0"/>
+                </a:solidFill>
+                <a:latin typeface="Cambria Math" panose="02040503050406030204" pitchFamily="18" charset="0"/>
+                <a:ea typeface="Cambria Math" panose="02040503050406030204" pitchFamily="18" charset="0"/>
+              </a:rPr>
+              <a:t>R</a:t>
+            </a:r>
+            <a:r>
+              <a:rPr lang="en-US" altLang="zh-CN" baseline="-25000" dirty="0">
+                <a:solidFill>
+                  <a:srgbClr val="7030A0"/>
+                </a:solidFill>
+                <a:latin typeface="Cambria Math" panose="02040503050406030204" pitchFamily="18" charset="0"/>
+                <a:ea typeface="Cambria Math" panose="02040503050406030204" pitchFamily="18" charset="0"/>
+              </a:rPr>
+              <a:t>1</a:t>
+            </a:r>
+            <a:r>
+              <a:rPr lang="en-US" altLang="zh-CN" dirty="0" smtClean="0">
+                <a:solidFill>
+                  <a:srgbClr val="7030A0"/>
+                </a:solidFill>
+                <a:latin typeface="Cambria Math" panose="02040503050406030204" pitchFamily="18" charset="0"/>
+                <a:ea typeface="Cambria Math" panose="02040503050406030204" pitchFamily="18" charset="0"/>
+              </a:rPr>
+              <a:t>, </a:t>
+            </a:r>
+            <a:r>
+              <a:rPr lang="en-US" altLang="zh-CN" dirty="0">
+                <a:solidFill>
+                  <a:srgbClr val="7030A0"/>
+                </a:solidFill>
+                <a:latin typeface="Cambria Math" panose="02040503050406030204" pitchFamily="18" charset="0"/>
+                <a:ea typeface="Cambria Math" panose="02040503050406030204" pitchFamily="18" charset="0"/>
+              </a:rPr>
+              <a:t># 100 </a:t>
+            </a:r>
+            <a:r>
+              <a:rPr lang="en-US" altLang="zh-CN" dirty="0"/>
+              <a:t>adds the integer 100 into register </a:t>
+            </a:r>
+            <a:r>
+              <a:rPr lang="en-US" altLang="zh-CN" dirty="0" smtClean="0"/>
+              <a:t>R</a:t>
+            </a:r>
+            <a:r>
+              <a:rPr lang="en-US" altLang="zh-CN" baseline="-25000" dirty="0" smtClean="0"/>
+              <a:t>1</a:t>
+            </a:r>
+            <a:r>
+              <a:rPr lang="en-US" altLang="zh-CN" dirty="0" smtClean="0"/>
+              <a:t>.</a:t>
+            </a:r>
+            <a:endParaRPr lang="en-US" altLang="zh-CN" dirty="0"/>
+          </a:p>
+        </p:txBody>
+      </p:sp>
+    </p:spTree>
+    <p:extLst>
+      <p:ext uri="{BB962C8B-B14F-4D97-AF65-F5344CB8AC3E}">
+        <p14:creationId xmlns:p14="http://schemas.microsoft.com/office/powerpoint/2010/main" val="2218854103"/>
       </p:ext>
     </p:extLst>
   </p:cSld>

</xml_diff>